<commit_message>
Passed version of terasolunaorg-guideline-101039346
</commit_message>
<xml_diff>
--- a/source/Security/images_Authentication/materialAuthentication.pptx
+++ b/source/Security/images_Authentication/materialAuthentication.pptx
@@ -2347,7 +2347,7 @@
             <a:fld id="{3BB47352-BF5A-4CD2-B029-996118CD8E01}" type="datetimeFigureOut">
               <a:rPr kumimoji="1" lang="ja-JP" altLang="en-US" smtClean="0"/>
               <a:pPr/>
-              <a:t>2015/10/22</a:t>
+              <a:t>2016/1/14</a:t>
             </a:fld>
             <a:endParaRPr kumimoji="1" lang="ja-JP" altLang="en-US"/>
           </a:p>
@@ -2830,7 +2830,7 @@
             <a:fld id="{7B9B12EC-6AA0-374B-A2D3-850081A07A26}" type="datetimeFigureOut">
               <a:rPr kumimoji="1" lang="ja-JP" altLang="en-US" smtClean="0"/>
               <a:pPr/>
-              <a:t>2015/10/22</a:t>
+              <a:t>2016/1/14</a:t>
             </a:fld>
             <a:endParaRPr kumimoji="1" lang="ja-JP" altLang="en-US"/>
           </a:p>
@@ -3034,7 +3034,7 @@
             <a:fld id="{7B9B12EC-6AA0-374B-A2D3-850081A07A26}" type="datetimeFigureOut">
               <a:rPr kumimoji="1" lang="ja-JP" altLang="en-US" smtClean="0"/>
               <a:pPr/>
-              <a:t>2015/10/22</a:t>
+              <a:t>2016/1/14</a:t>
             </a:fld>
             <a:endParaRPr kumimoji="1" lang="ja-JP" altLang="en-US"/>
           </a:p>
@@ -3248,7 +3248,7 @@
             <a:fld id="{7B9B12EC-6AA0-374B-A2D3-850081A07A26}" type="datetimeFigureOut">
               <a:rPr kumimoji="1" lang="ja-JP" altLang="en-US" smtClean="0"/>
               <a:pPr/>
-              <a:t>2015/10/22</a:t>
+              <a:t>2016/1/14</a:t>
             </a:fld>
             <a:endParaRPr kumimoji="1" lang="ja-JP" altLang="en-US"/>
           </a:p>
@@ -3452,7 +3452,7 @@
             <a:fld id="{7B9B12EC-6AA0-374B-A2D3-850081A07A26}" type="datetimeFigureOut">
               <a:rPr kumimoji="1" lang="ja-JP" altLang="en-US" smtClean="0"/>
               <a:pPr/>
-              <a:t>2015/10/22</a:t>
+              <a:t>2016/1/14</a:t>
             </a:fld>
             <a:endParaRPr kumimoji="1" lang="ja-JP" altLang="en-US"/>
           </a:p>
@@ -3700,7 +3700,7 @@
             <a:fld id="{7B9B12EC-6AA0-374B-A2D3-850081A07A26}" type="datetimeFigureOut">
               <a:rPr kumimoji="1" lang="ja-JP" altLang="en-US" smtClean="0"/>
               <a:pPr/>
-              <a:t>2015/10/22</a:t>
+              <a:t>2016/1/14</a:t>
             </a:fld>
             <a:endParaRPr kumimoji="1" lang="ja-JP" altLang="en-US"/>
           </a:p>
@@ -4054,7 +4054,7 @@
             <a:fld id="{7B9B12EC-6AA0-374B-A2D3-850081A07A26}" type="datetimeFigureOut">
               <a:rPr kumimoji="1" lang="ja-JP" altLang="en-US" smtClean="0"/>
               <a:pPr/>
-              <a:t>2015/10/22</a:t>
+              <a:t>2016/1/14</a:t>
             </a:fld>
             <a:endParaRPr kumimoji="1" lang="ja-JP" altLang="en-US"/>
           </a:p>
@@ -4542,7 +4542,7 @@
             <a:fld id="{7B9B12EC-6AA0-374B-A2D3-850081A07A26}" type="datetimeFigureOut">
               <a:rPr kumimoji="1" lang="ja-JP" altLang="en-US" smtClean="0"/>
               <a:pPr/>
-              <a:t>2015/10/22</a:t>
+              <a:t>2016/1/14</a:t>
             </a:fld>
             <a:endParaRPr kumimoji="1" lang="ja-JP" altLang="en-US"/>
           </a:p>
@@ -4662,7 +4662,7 @@
             <a:fld id="{7B9B12EC-6AA0-374B-A2D3-850081A07A26}" type="datetimeFigureOut">
               <a:rPr kumimoji="1" lang="ja-JP" altLang="en-US" smtClean="0"/>
               <a:pPr/>
-              <a:t>2015/10/22</a:t>
+              <a:t>2016/1/14</a:t>
             </a:fld>
             <a:endParaRPr kumimoji="1" lang="ja-JP" altLang="en-US"/>
           </a:p>
@@ -4759,7 +4759,7 @@
             <a:fld id="{7B9B12EC-6AA0-374B-A2D3-850081A07A26}" type="datetimeFigureOut">
               <a:rPr kumimoji="1" lang="ja-JP" altLang="en-US" smtClean="0"/>
               <a:pPr/>
-              <a:t>2015/10/22</a:t>
+              <a:t>2016/1/14</a:t>
             </a:fld>
             <a:endParaRPr kumimoji="1" lang="ja-JP" altLang="en-US"/>
           </a:p>
@@ -5070,7 +5070,7 @@
             <a:fld id="{7B9B12EC-6AA0-374B-A2D3-850081A07A26}" type="datetimeFigureOut">
               <a:rPr kumimoji="1" lang="ja-JP" altLang="en-US" smtClean="0"/>
               <a:pPr/>
-              <a:t>2015/10/22</a:t>
+              <a:t>2016/1/14</a:t>
             </a:fld>
             <a:endParaRPr kumimoji="1" lang="ja-JP" altLang="en-US"/>
           </a:p>
@@ -5325,7 +5325,7 @@
             <a:fld id="{7B9B12EC-6AA0-374B-A2D3-850081A07A26}" type="datetimeFigureOut">
               <a:rPr kumimoji="1" lang="ja-JP" altLang="en-US" smtClean="0"/>
               <a:pPr/>
-              <a:t>2015/10/22</a:t>
+              <a:t>2016/1/14</a:t>
             </a:fld>
             <a:endParaRPr kumimoji="1" lang="ja-JP" altLang="en-US"/>
           </a:p>
@@ -5572,7 +5572,7 @@
             <a:fld id="{7B9B12EC-6AA0-374B-A2D3-850081A07A26}" type="datetimeFigureOut">
               <a:rPr kumimoji="1" lang="ja-JP" altLang="en-US" smtClean="0"/>
               <a:pPr/>
-              <a:t>2015/10/22</a:t>
+              <a:t>2016/1/14</a:t>
             </a:fld>
             <a:endParaRPr kumimoji="1" lang="ja-JP" altLang="en-US"/>
           </a:p>
@@ -6336,8 +6336,9 @@
           </a:bodyPr>
           <a:lstStyle/>
           <a:p>
-            <a:r>
-              <a:rPr kumimoji="1" lang="ja-JP" altLang="en-US" sz="1600" b="1" dirty="0" smtClean="0">
+            <a:pPr algn="ctr"/>
+            <a:r>
+              <a:rPr kumimoji="1" lang="en-US" altLang="ja-JP" sz="1600" b="1" dirty="0" smtClean="0">
                 <a:solidFill>
                   <a:schemeClr val="tx1">
                     <a:lumMod val="75000"/>
@@ -6347,7 +6348,7 @@
                 <a:latin typeface="HGP創英角ｺﾞｼｯｸUB" panose="020B0900000000000000" pitchFamily="50" charset="-128"/>
                 <a:ea typeface="HGP創英角ｺﾞｼｯｸUB" panose="020B0900000000000000" pitchFamily="50" charset="-128"/>
               </a:rPr>
-              <a:t>クライアント</a:t>
+              <a:t>Client</a:t>
             </a:r>
             <a:endParaRPr kumimoji="1" lang="ja-JP" altLang="en-US" sz="1600" b="1" dirty="0">
               <a:solidFill>
@@ -6370,8 +6371,8 @@
         </p:nvSpPr>
         <p:spPr>
           <a:xfrm>
-            <a:off x="4617730" y="1500396"/>
-            <a:ext cx="4274750" cy="3888432"/>
+            <a:off x="4532196" y="1500396"/>
+            <a:ext cx="4360284" cy="3888432"/>
           </a:xfrm>
           <a:prstGeom prst="rect">
             <a:avLst/>
@@ -6884,102 +6885,6 @@
       </p:cxnSp>
       <p:sp>
         <p:nvSpPr>
-          <p:cNvPr id="53" name="テキスト ボックス 52"/>
-          <p:cNvSpPr txBox="1"/>
-          <p:nvPr/>
-        </p:nvSpPr>
-        <p:spPr>
-          <a:xfrm>
-            <a:off x="4947117" y="3444612"/>
-            <a:ext cx="800219" cy="461665"/>
-          </a:xfrm>
-          <a:prstGeom prst="rect">
-            <a:avLst/>
-          </a:prstGeom>
-          <a:noFill/>
-        </p:spPr>
-        <p:txBody>
-          <a:bodyPr wrap="none" rtlCol="0">
-            <a:spAutoFit/>
-          </a:bodyPr>
-          <a:lstStyle/>
-          <a:p>
-            <a:r>
-              <a:rPr lang="ja-JP" altLang="en-US" sz="2400" dirty="0">
-                <a:solidFill>
-                  <a:schemeClr val="tx1">
-                    <a:lumMod val="50000"/>
-                    <a:lumOff val="50000"/>
-                  </a:schemeClr>
-                </a:solidFill>
-                <a:latin typeface="HGP創英角ｺﾞｼｯｸUB" panose="020B0900000000000000" pitchFamily="50" charset="-128"/>
-                <a:ea typeface="HGP創英角ｺﾞｼｯｸUB" panose="020B0900000000000000" pitchFamily="50" charset="-128"/>
-              </a:rPr>
-              <a:t>実装</a:t>
-            </a:r>
-            <a:endParaRPr kumimoji="1" lang="ja-JP" altLang="en-US" sz="2400" dirty="0">
-              <a:solidFill>
-                <a:schemeClr val="tx1">
-                  <a:lumMod val="50000"/>
-                  <a:lumOff val="50000"/>
-                </a:schemeClr>
-              </a:solidFill>
-              <a:latin typeface="HGP創英角ｺﾞｼｯｸUB" panose="020B0900000000000000" pitchFamily="50" charset="-128"/>
-              <a:ea typeface="HGP創英角ｺﾞｼｯｸUB" panose="020B0900000000000000" pitchFamily="50" charset="-128"/>
-            </a:endParaRPr>
-          </a:p>
-        </p:txBody>
-      </p:sp>
-      <p:sp>
-        <p:nvSpPr>
-          <p:cNvPr id="54" name="テキスト ボックス 53"/>
-          <p:cNvSpPr txBox="1"/>
-          <p:nvPr/>
-        </p:nvSpPr>
-        <p:spPr>
-          <a:xfrm>
-            <a:off x="7732221" y="3448445"/>
-            <a:ext cx="800219" cy="461665"/>
-          </a:xfrm>
-          <a:prstGeom prst="rect">
-            <a:avLst/>
-          </a:prstGeom>
-          <a:noFill/>
-        </p:spPr>
-        <p:txBody>
-          <a:bodyPr wrap="none" rtlCol="0">
-            <a:spAutoFit/>
-          </a:bodyPr>
-          <a:lstStyle/>
-          <a:p>
-            <a:r>
-              <a:rPr lang="ja-JP" altLang="en-US" sz="2400" dirty="0">
-                <a:solidFill>
-                  <a:schemeClr val="tx1">
-                    <a:lumMod val="50000"/>
-                    <a:lumOff val="50000"/>
-                  </a:schemeClr>
-                </a:solidFill>
-                <a:latin typeface="HGP創英角ｺﾞｼｯｸUB" panose="020B0900000000000000" pitchFamily="50" charset="-128"/>
-                <a:ea typeface="HGP創英角ｺﾞｼｯｸUB" panose="020B0900000000000000" pitchFamily="50" charset="-128"/>
-              </a:rPr>
-              <a:t>実装</a:t>
-            </a:r>
-            <a:endParaRPr kumimoji="1" lang="ja-JP" altLang="en-US" sz="2400" dirty="0">
-              <a:solidFill>
-                <a:schemeClr val="tx1">
-                  <a:lumMod val="50000"/>
-                  <a:lumOff val="50000"/>
-                </a:schemeClr>
-              </a:solidFill>
-              <a:latin typeface="HGP創英角ｺﾞｼｯｸUB" panose="020B0900000000000000" pitchFamily="50" charset="-128"/>
-              <a:ea typeface="HGP創英角ｺﾞｼｯｸUB" panose="020B0900000000000000" pitchFamily="50" charset="-128"/>
-            </a:endParaRPr>
-          </a:p>
-        </p:txBody>
-      </p:sp>
-      <p:sp>
-        <p:nvSpPr>
           <p:cNvPr id="56" name="正方形/長方形 55"/>
           <p:cNvSpPr/>
           <p:nvPr/>
@@ -7085,8 +6990,8 @@
         </p:nvSpPr>
         <p:spPr>
           <a:xfrm>
-            <a:off x="4783189" y="2062069"/>
-            <a:ext cx="3893267" cy="3137101"/>
+            <a:off x="4689030" y="2062069"/>
+            <a:ext cx="4078695" cy="3137101"/>
           </a:xfrm>
           <a:prstGeom prst="rect">
             <a:avLst/>
@@ -7142,8 +7047,8 @@
         </p:nvSpPr>
         <p:spPr>
           <a:xfrm>
-            <a:off x="1758001" y="3662511"/>
-            <a:ext cx="2164748" cy="898401"/>
+            <a:off x="383412" y="3731260"/>
+            <a:ext cx="2883447" cy="1248627"/>
           </a:xfrm>
           <a:prstGeom prst="wedgeEllipseCallout">
             <a:avLst>
@@ -7187,7 +7092,7 @@
           <a:p>
             <a:pPr algn="ctr"/>
             <a:r>
-              <a:rPr kumimoji="1" lang="ja-JP" altLang="en-US" dirty="0" smtClean="0">
+              <a:rPr lang="en-US" altLang="ja-JP" dirty="0">
                 <a:solidFill>
                   <a:schemeClr val="tx1">
                     <a:lumMod val="75000"/>
@@ -7197,7 +7102,33 @@
                 <a:latin typeface="HGP創英角ｺﾞｼｯｸUB" panose="020B0900000000000000" pitchFamily="50" charset="-128"/>
                 <a:ea typeface="HGP創英角ｺﾞｼｯｸUB" panose="020B0900000000000000" pitchFamily="50" charset="-128"/>
               </a:rPr>
-              <a:t>認証方式の</a:t>
+              <a:t>P</a:t>
+            </a:r>
+            <a:r>
+              <a:rPr lang="en-US" altLang="ja-JP" dirty="0" smtClean="0">
+                <a:solidFill>
+                  <a:schemeClr val="tx1">
+                    <a:lumMod val="75000"/>
+                    <a:lumOff val="25000"/>
+                  </a:schemeClr>
+                </a:solidFill>
+                <a:latin typeface="HGP創英角ｺﾞｼｯｸUB" panose="020B0900000000000000" pitchFamily="50" charset="-128"/>
+                <a:ea typeface="HGP創英角ｺﾞｼｯｸUB" panose="020B0900000000000000" pitchFamily="50" charset="-128"/>
+              </a:rPr>
+              <a:t>rovide an implementation </a:t>
+            </a:r>
+            <a:r>
+              <a:rPr lang="en-US" altLang="ja-JP" dirty="0">
+                <a:solidFill>
+                  <a:schemeClr val="tx1">
+                    <a:lumMod val="75000"/>
+                    <a:lumOff val="25000"/>
+                  </a:schemeClr>
+                </a:solidFill>
+                <a:latin typeface="HGP創英角ｺﾞｼｯｸUB" panose="020B0900000000000000" pitchFamily="50" charset="-128"/>
+                <a:ea typeface="HGP創英角ｺﾞｼｯｸUB" panose="020B0900000000000000" pitchFamily="50" charset="-128"/>
+              </a:rPr>
+              <a:t>of authentication methods</a:t>
             </a:r>
             <a:endParaRPr kumimoji="1" lang="en-US" altLang="ja-JP" dirty="0" smtClean="0">
               <a:solidFill>
@@ -7210,32 +7141,6 @@
               <a:ea typeface="HGP創英角ｺﾞｼｯｸUB" panose="020B0900000000000000" pitchFamily="50" charset="-128"/>
             </a:endParaRPr>
           </a:p>
-          <a:p>
-            <a:pPr algn="ctr"/>
-            <a:r>
-              <a:rPr lang="ja-JP" altLang="en-US" dirty="0" smtClean="0">
-                <a:solidFill>
-                  <a:schemeClr val="tx1">
-                    <a:lumMod val="75000"/>
-                    <a:lumOff val="25000"/>
-                  </a:schemeClr>
-                </a:solidFill>
-                <a:latin typeface="HGP創英角ｺﾞｼｯｸUB" panose="020B0900000000000000" pitchFamily="50" charset="-128"/>
-                <a:ea typeface="HGP創英角ｺﾞｼｯｸUB" panose="020B0900000000000000" pitchFamily="50" charset="-128"/>
-              </a:rPr>
-              <a:t>実装を提供</a:t>
-            </a:r>
-            <a:endParaRPr kumimoji="1" lang="en-US" altLang="ja-JP" dirty="0" smtClean="0">
-              <a:solidFill>
-                <a:schemeClr val="tx1">
-                  <a:lumMod val="75000"/>
-                  <a:lumOff val="25000"/>
-                </a:schemeClr>
-              </a:solidFill>
-              <a:latin typeface="HGP創英角ｺﾞｼｯｸUB" panose="020B0900000000000000" pitchFamily="50" charset="-128"/>
-              <a:ea typeface="HGP創英角ｺﾞｼｯｸUB" panose="020B0900000000000000" pitchFamily="50" charset="-128"/>
-            </a:endParaRPr>
-          </a:p>
         </p:txBody>
       </p:sp>
       <p:sp>
@@ -7246,8 +7151,8 @@
         </p:nvSpPr>
         <p:spPr>
           <a:xfrm>
-            <a:off x="2195736" y="4690839"/>
-            <a:ext cx="2164748" cy="898401"/>
+            <a:off x="2051720" y="4718521"/>
+            <a:ext cx="2389207" cy="898401"/>
           </a:xfrm>
           <a:prstGeom prst="wedgeEllipseCallout">
             <a:avLst>
@@ -7291,7 +7196,7 @@
           <a:p>
             <a:pPr algn="ctr"/>
             <a:r>
-              <a:rPr lang="ja-JP" altLang="en-US" dirty="0" smtClean="0">
+              <a:rPr lang="en-US" altLang="ja-JP" dirty="0" smtClean="0">
                 <a:solidFill>
                   <a:schemeClr val="tx1">
                     <a:lumMod val="75000"/>
@@ -7301,23 +7206,10 @@
                 <a:latin typeface="HGP創英角ｺﾞｼｯｸUB" panose="020B0900000000000000" pitchFamily="50" charset="-128"/>
                 <a:ea typeface="HGP創英角ｺﾞｼｯｸUB" panose="020B0900000000000000" pitchFamily="50" charset="-128"/>
               </a:rPr>
-              <a:t>認証処理</a:t>
-            </a:r>
-            <a:endParaRPr lang="en-US" altLang="ja-JP" dirty="0" smtClean="0">
-              <a:solidFill>
-                <a:schemeClr val="tx1">
-                  <a:lumMod val="75000"/>
-                  <a:lumOff val="25000"/>
-                </a:schemeClr>
-              </a:solidFill>
-              <a:latin typeface="HGP創英角ｺﾞｼｯｸUB" panose="020B0900000000000000" pitchFamily="50" charset="-128"/>
-              <a:ea typeface="HGP創英角ｺﾞｼｯｸUB" panose="020B0900000000000000" pitchFamily="50" charset="-128"/>
-            </a:endParaRPr>
-          </a:p>
-          <a:p>
-            <a:pPr algn="ctr"/>
-            <a:r>
-              <a:rPr lang="ja-JP" altLang="en-US" dirty="0" smtClean="0">
+              <a:t>Provide </a:t>
+            </a:r>
+            <a:r>
+              <a:rPr lang="en-US" altLang="ja-JP" dirty="0">
                 <a:solidFill>
                   <a:schemeClr val="tx1">
                     <a:lumMod val="75000"/>
@@ -7327,7 +7219,7 @@
                 <a:latin typeface="HGP創英角ｺﾞｼｯｸUB" panose="020B0900000000000000" pitchFamily="50" charset="-128"/>
                 <a:ea typeface="HGP創英角ｺﾞｼｯｸUB" panose="020B0900000000000000" pitchFamily="50" charset="-128"/>
               </a:rPr>
-              <a:t>を提供</a:t>
+              <a:t>an authentication process</a:t>
             </a:r>
             <a:endParaRPr lang="en-US" altLang="ja-JP" dirty="0" smtClean="0">
               <a:solidFill>
@@ -7903,6 +7795,102 @@
               </a:rPr>
               <a:t>Provider</a:t>
             </a:r>
+          </a:p>
+        </p:txBody>
+      </p:sp>
+      <p:sp>
+        <p:nvSpPr>
+          <p:cNvPr id="53" name="テキスト ボックス 52"/>
+          <p:cNvSpPr txBox="1"/>
+          <p:nvPr/>
+        </p:nvSpPr>
+        <p:spPr>
+          <a:xfrm>
+            <a:off x="4636096" y="3540778"/>
+            <a:ext cx="1183337" cy="338554"/>
+          </a:xfrm>
+          <a:prstGeom prst="rect">
+            <a:avLst/>
+          </a:prstGeom>
+          <a:noFill/>
+        </p:spPr>
+        <p:txBody>
+          <a:bodyPr wrap="none" rtlCol="0">
+            <a:spAutoFit/>
+          </a:bodyPr>
+          <a:lstStyle/>
+          <a:p>
+            <a:r>
+              <a:rPr lang="en-US" altLang="ja-JP" sz="1600" dirty="0" smtClean="0">
+                <a:solidFill>
+                  <a:schemeClr val="tx1">
+                    <a:lumMod val="50000"/>
+                    <a:lumOff val="50000"/>
+                  </a:schemeClr>
+                </a:solidFill>
+                <a:latin typeface="HGP創英角ｺﾞｼｯｸUB" panose="020B0900000000000000" pitchFamily="50" charset="-128"/>
+                <a:ea typeface="HGP創英角ｺﾞｼｯｸUB" panose="020B0900000000000000" pitchFamily="50" charset="-128"/>
+              </a:rPr>
+              <a:t>implements</a:t>
+            </a:r>
+            <a:endParaRPr kumimoji="1" lang="ja-JP" altLang="en-US" sz="1600" dirty="0">
+              <a:solidFill>
+                <a:schemeClr val="tx1">
+                  <a:lumMod val="50000"/>
+                  <a:lumOff val="50000"/>
+                </a:schemeClr>
+              </a:solidFill>
+              <a:latin typeface="HGP創英角ｺﾞｼｯｸUB" panose="020B0900000000000000" pitchFamily="50" charset="-128"/>
+              <a:ea typeface="HGP創英角ｺﾞｼｯｸUB" panose="020B0900000000000000" pitchFamily="50" charset="-128"/>
+            </a:endParaRPr>
+          </a:p>
+        </p:txBody>
+      </p:sp>
+      <p:sp>
+        <p:nvSpPr>
+          <p:cNvPr id="31" name="テキスト ボックス 30"/>
+          <p:cNvSpPr txBox="1"/>
+          <p:nvPr/>
+        </p:nvSpPr>
+        <p:spPr>
+          <a:xfrm>
+            <a:off x="7584389" y="3516108"/>
+            <a:ext cx="1183337" cy="338554"/>
+          </a:xfrm>
+          <a:prstGeom prst="rect">
+            <a:avLst/>
+          </a:prstGeom>
+          <a:noFill/>
+        </p:spPr>
+        <p:txBody>
+          <a:bodyPr wrap="none" rtlCol="0">
+            <a:spAutoFit/>
+          </a:bodyPr>
+          <a:lstStyle/>
+          <a:p>
+            <a:r>
+              <a:rPr lang="en-US" altLang="ja-JP" sz="1600" dirty="0" smtClean="0">
+                <a:solidFill>
+                  <a:schemeClr val="tx1">
+                    <a:lumMod val="50000"/>
+                    <a:lumOff val="50000"/>
+                  </a:schemeClr>
+                </a:solidFill>
+                <a:latin typeface="HGP創英角ｺﾞｼｯｸUB" panose="020B0900000000000000" pitchFamily="50" charset="-128"/>
+                <a:ea typeface="HGP創英角ｺﾞｼｯｸUB" panose="020B0900000000000000" pitchFamily="50" charset="-128"/>
+              </a:rPr>
+              <a:t>implements</a:t>
+            </a:r>
+            <a:endParaRPr kumimoji="1" lang="ja-JP" altLang="en-US" sz="1600" dirty="0">
+              <a:solidFill>
+                <a:schemeClr val="tx1">
+                  <a:lumMod val="50000"/>
+                  <a:lumOff val="50000"/>
+                </a:schemeClr>
+              </a:solidFill>
+              <a:latin typeface="HGP創英角ｺﾞｼｯｸUB" panose="020B0900000000000000" pitchFamily="50" charset="-128"/>
+              <a:ea typeface="HGP創英角ｺﾞｼｯｸUB" panose="020B0900000000000000" pitchFamily="50" charset="-128"/>
+            </a:endParaRPr>
           </a:p>
         </p:txBody>
       </p:sp>
@@ -8370,8 +8358,9 @@
           </a:bodyPr>
           <a:lstStyle/>
           <a:p>
-            <a:r>
-              <a:rPr kumimoji="1" lang="ja-JP" altLang="en-US" sz="1600" b="1" dirty="0" smtClean="0">
+            <a:pPr algn="ctr"/>
+            <a:r>
+              <a:rPr kumimoji="1" lang="en-US" altLang="ja-JP" sz="1600" b="1" dirty="0" smtClean="0">
                 <a:solidFill>
                   <a:schemeClr val="tx1">
                     <a:lumMod val="75000"/>
@@ -8381,7 +8370,7 @@
                 <a:latin typeface="HGP創英角ｺﾞｼｯｸUB" panose="020B0900000000000000" pitchFamily="50" charset="-128"/>
                 <a:ea typeface="HGP創英角ｺﾞｼｯｸUB" panose="020B0900000000000000" pitchFamily="50" charset="-128"/>
               </a:rPr>
-              <a:t>クライアント</a:t>
+              <a:t>Client</a:t>
             </a:r>
             <a:endParaRPr kumimoji="1" lang="ja-JP" altLang="en-US" sz="1600" b="1" dirty="0">
               <a:solidFill>
@@ -8701,8 +8690,8 @@
         </p:nvSpPr>
         <p:spPr>
           <a:xfrm>
-            <a:off x="5776683" y="3400602"/>
-            <a:ext cx="2090490" cy="967818"/>
+            <a:off x="5776683" y="3400601"/>
+            <a:ext cx="2090490" cy="1187031"/>
           </a:xfrm>
           <a:prstGeom prst="wedgeEllipseCallout">
             <a:avLst>
@@ -8746,7 +8735,7 @@
           <a:p>
             <a:pPr algn="ctr"/>
             <a:r>
-              <a:rPr lang="ja-JP" altLang="en-US" dirty="0" smtClean="0">
+              <a:rPr lang="en-US" altLang="ja-JP" sz="1600" dirty="0" smtClean="0">
                 <a:solidFill>
                   <a:schemeClr val="tx1">
                     <a:lumMod val="75000"/>
@@ -8756,9 +8745,48 @@
                 <a:latin typeface="HGP創英角ｺﾞｼｯｸUB" panose="020B0900000000000000" pitchFamily="50" charset="-128"/>
                 <a:ea typeface="HGP創英角ｺﾞｼｯｸUB" panose="020B0900000000000000" pitchFamily="50" charset="-128"/>
               </a:rPr>
-              <a:t>認証成功時のレスポンスを制御</a:t>
-            </a:r>
-            <a:endParaRPr lang="en-US" altLang="ja-JP" dirty="0" smtClean="0">
+              <a:t>Control </a:t>
+            </a:r>
+            <a:r>
+              <a:rPr lang="en-US" altLang="ja-JP" sz="1600" dirty="0">
+                <a:solidFill>
+                  <a:schemeClr val="tx1">
+                    <a:lumMod val="75000"/>
+                    <a:lumOff val="25000"/>
+                  </a:schemeClr>
+                </a:solidFill>
+                <a:latin typeface="HGP創英角ｺﾞｼｯｸUB" panose="020B0900000000000000" pitchFamily="50" charset="-128"/>
+                <a:ea typeface="HGP創英角ｺﾞｼｯｸUB" panose="020B0900000000000000" pitchFamily="50" charset="-128"/>
+              </a:rPr>
+              <a:t>the response </a:t>
+            </a:r>
+            <a:r>
+              <a:rPr lang="en-US" altLang="ja-JP" sz="1600" dirty="0" smtClean="0">
+                <a:solidFill>
+                  <a:schemeClr val="tx1">
+                    <a:lumMod val="75000"/>
+                    <a:lumOff val="25000"/>
+                  </a:schemeClr>
+                </a:solidFill>
+                <a:latin typeface="HGP創英角ｺﾞｼｯｸUB" panose="020B0900000000000000" pitchFamily="50" charset="-128"/>
+                <a:ea typeface="HGP創英角ｺﾞｼｯｸUB" panose="020B0900000000000000" pitchFamily="50" charset="-128"/>
+              </a:rPr>
+              <a:t>on authentication </a:t>
+            </a:r>
+            <a:r>
+              <a:rPr lang="en-US" altLang="ja-JP" sz="1600" dirty="0">
+                <a:solidFill>
+                  <a:schemeClr val="tx1">
+                    <a:lumMod val="75000"/>
+                    <a:lumOff val="25000"/>
+                  </a:schemeClr>
+                </a:solidFill>
+                <a:latin typeface="HGP創英角ｺﾞｼｯｸUB" panose="020B0900000000000000" pitchFamily="50" charset="-128"/>
+                <a:ea typeface="HGP創英角ｺﾞｼｯｸUB" panose="020B0900000000000000" pitchFamily="50" charset="-128"/>
+              </a:rPr>
+              <a:t>success</a:t>
+            </a:r>
+            <a:endParaRPr lang="en-US" altLang="ja-JP" sz="1600" dirty="0" smtClean="0">
               <a:solidFill>
                 <a:schemeClr val="tx1">
                   <a:lumMod val="75000"/>
@@ -9103,16 +9131,142 @@
           </a:p>
         </p:txBody>
       </p:sp>
-      <p:sp>
-        <p:nvSpPr>
-          <p:cNvPr id="65" name="円形吹き出し 64"/>
+      <p:cxnSp>
+        <p:nvCxnSpPr>
+          <p:cNvPr id="73" name="直線矢印コネクタ 72"/>
+          <p:cNvCxnSpPr>
+            <a:stCxn id="40" idx="1"/>
+          </p:cNvCxnSpPr>
+          <p:nvPr/>
+        </p:nvCxnSpPr>
+        <p:spPr bwMode="invGray">
+          <a:xfrm flipH="1">
+            <a:off x="1107140" y="2467474"/>
+            <a:ext cx="990310" cy="0"/>
+          </a:xfrm>
+          <a:prstGeom prst="straightConnector1">
+            <a:avLst/>
+          </a:prstGeom>
+          <a:ln w="50800">
+            <a:solidFill>
+              <a:schemeClr val="tx2">
+                <a:lumMod val="40000"/>
+                <a:lumOff val="60000"/>
+              </a:schemeClr>
+            </a:solidFill>
+            <a:headEnd type="triangle" w="lg" len="lg"/>
+            <a:tailEnd type="triangle" w="lg" len="lg"/>
+          </a:ln>
+        </p:spPr>
+        <p:style>
+          <a:lnRef idx="1">
+            <a:schemeClr val="accent1"/>
+          </a:lnRef>
+          <a:fillRef idx="0">
+            <a:schemeClr val="accent1"/>
+          </a:fillRef>
+          <a:effectRef idx="0">
+            <a:schemeClr val="accent1"/>
+          </a:effectRef>
+          <a:fontRef idx="minor">
+            <a:schemeClr val="tx1"/>
+          </a:fontRef>
+        </p:style>
+      </p:cxnSp>
+      <p:sp>
+        <p:nvSpPr>
+          <p:cNvPr id="74" name="円形吹き出し 73"/>
           <p:cNvSpPr/>
           <p:nvPr/>
         </p:nvSpPr>
         <p:spPr>
           <a:xfrm>
-            <a:off x="5823294" y="4507703"/>
-            <a:ext cx="2090490" cy="967818"/>
+            <a:off x="311085" y="3053138"/>
+            <a:ext cx="2336455" cy="967818"/>
+          </a:xfrm>
+          <a:prstGeom prst="wedgeEllipseCallout">
+            <a:avLst>
+              <a:gd name="adj1" fmla="val 25995"/>
+              <a:gd name="adj2" fmla="val -61182"/>
+            </a:avLst>
+          </a:prstGeom>
+          <a:solidFill>
+            <a:schemeClr val="accent6">
+              <a:lumMod val="60000"/>
+              <a:lumOff val="40000"/>
+            </a:schemeClr>
+          </a:solidFill>
+          <a:ln w="12700">
+            <a:solidFill>
+              <a:schemeClr val="accent6">
+                <a:lumMod val="40000"/>
+                <a:lumOff val="60000"/>
+              </a:schemeClr>
+            </a:solidFill>
+          </a:ln>
+          <a:effectLst/>
+        </p:spPr>
+        <p:style>
+          <a:lnRef idx="3">
+            <a:schemeClr val="lt1"/>
+          </a:lnRef>
+          <a:fillRef idx="1">
+            <a:schemeClr val="accent6"/>
+          </a:fillRef>
+          <a:effectRef idx="1">
+            <a:schemeClr val="accent6"/>
+          </a:effectRef>
+          <a:fontRef idx="minor">
+            <a:schemeClr val="lt1"/>
+          </a:fontRef>
+        </p:style>
+        <p:txBody>
+          <a:bodyPr rtlCol="0" anchor="ctr"/>
+          <a:lstStyle/>
+          <a:p>
+            <a:pPr algn="ctr"/>
+            <a:r>
+              <a:rPr lang="en-US" altLang="ja-JP" dirty="0" smtClean="0">
+                <a:solidFill>
+                  <a:schemeClr val="tx1">
+                    <a:lumMod val="75000"/>
+                    <a:lumOff val="25000"/>
+                  </a:schemeClr>
+                </a:solidFill>
+                <a:latin typeface="HGP創英角ｺﾞｼｯｸUB" panose="020B0900000000000000" pitchFamily="50" charset="-128"/>
+                <a:ea typeface="HGP創英角ｺﾞｼｯｸUB" panose="020B0900000000000000" pitchFamily="50" charset="-128"/>
+              </a:rPr>
+              <a:t>Servlet Filter</a:t>
+            </a:r>
+          </a:p>
+          <a:p>
+            <a:pPr algn="ctr"/>
+            <a:r>
+              <a:rPr lang="en-US" altLang="ja-JP" dirty="0" smtClean="0">
+                <a:solidFill>
+                  <a:schemeClr val="tx1">
+                    <a:lumMod val="75000"/>
+                    <a:lumOff val="25000"/>
+                  </a:schemeClr>
+                </a:solidFill>
+                <a:latin typeface="HGP創英角ｺﾞｼｯｸUB" panose="020B0900000000000000" pitchFamily="50" charset="-128"/>
+                <a:ea typeface="HGP創英角ｺﾞｼｯｸUB" panose="020B0900000000000000" pitchFamily="50" charset="-128"/>
+              </a:rPr>
+              <a:t>for Form Authentication</a:t>
+            </a:r>
+          </a:p>
+        </p:txBody>
+      </p:sp>
+      <p:sp>
+        <p:nvSpPr>
+          <p:cNvPr id="20" name="円形吹き出し 19"/>
+          <p:cNvSpPr/>
+          <p:nvPr/>
+        </p:nvSpPr>
+        <p:spPr>
+          <a:xfrm>
+            <a:off x="5773387" y="4653933"/>
+            <a:ext cx="2090490" cy="1187031"/>
           </a:xfrm>
           <a:prstGeom prst="wedgeEllipseCallout">
             <a:avLst>
@@ -9156,7 +9310,7 @@
           <a:p>
             <a:pPr algn="ctr"/>
             <a:r>
-              <a:rPr lang="ja-JP" altLang="en-US" dirty="0" smtClean="0">
+              <a:rPr lang="en-US" altLang="ja-JP" sz="1600" dirty="0" smtClean="0">
                 <a:solidFill>
                   <a:schemeClr val="tx1">
                     <a:lumMod val="75000"/>
@@ -9166,117 +9320,10 @@
                 <a:latin typeface="HGP創英角ｺﾞｼｯｸUB" panose="020B0900000000000000" pitchFamily="50" charset="-128"/>
                 <a:ea typeface="HGP創英角ｺﾞｼｯｸUB" panose="020B0900000000000000" pitchFamily="50" charset="-128"/>
               </a:rPr>
-              <a:t>認証失敗時のレスポンスを制御</a:t>
-            </a:r>
-            <a:endParaRPr lang="en-US" altLang="ja-JP" dirty="0" smtClean="0">
-              <a:solidFill>
-                <a:schemeClr val="tx1">
-                  <a:lumMod val="75000"/>
-                  <a:lumOff val="25000"/>
-                </a:schemeClr>
-              </a:solidFill>
-              <a:latin typeface="HGP創英角ｺﾞｼｯｸUB" panose="020B0900000000000000" pitchFamily="50" charset="-128"/>
-              <a:ea typeface="HGP創英角ｺﾞｼｯｸUB" panose="020B0900000000000000" pitchFamily="50" charset="-128"/>
-            </a:endParaRPr>
-          </a:p>
-        </p:txBody>
-      </p:sp>
-      <p:cxnSp>
-        <p:nvCxnSpPr>
-          <p:cNvPr id="73" name="直線矢印コネクタ 72"/>
-          <p:cNvCxnSpPr>
-            <a:stCxn id="40" idx="1"/>
-          </p:cNvCxnSpPr>
-          <p:nvPr/>
-        </p:nvCxnSpPr>
-        <p:spPr bwMode="invGray">
-          <a:xfrm flipH="1">
-            <a:off x="1107140" y="2467474"/>
-            <a:ext cx="990310" cy="0"/>
-          </a:xfrm>
-          <a:prstGeom prst="straightConnector1">
-            <a:avLst/>
-          </a:prstGeom>
-          <a:ln w="50800">
-            <a:solidFill>
-              <a:schemeClr val="tx2">
-                <a:lumMod val="40000"/>
-                <a:lumOff val="60000"/>
-              </a:schemeClr>
-            </a:solidFill>
-            <a:headEnd type="triangle" w="lg" len="lg"/>
-            <a:tailEnd type="triangle" w="lg" len="lg"/>
-          </a:ln>
-        </p:spPr>
-        <p:style>
-          <a:lnRef idx="1">
-            <a:schemeClr val="accent1"/>
-          </a:lnRef>
-          <a:fillRef idx="0">
-            <a:schemeClr val="accent1"/>
-          </a:fillRef>
-          <a:effectRef idx="0">
-            <a:schemeClr val="accent1"/>
-          </a:effectRef>
-          <a:fontRef idx="minor">
-            <a:schemeClr val="tx1"/>
-          </a:fontRef>
-        </p:style>
-      </p:cxnSp>
-      <p:sp>
-        <p:nvSpPr>
-          <p:cNvPr id="74" name="円形吹き出し 73"/>
-          <p:cNvSpPr/>
-          <p:nvPr/>
-        </p:nvSpPr>
-        <p:spPr>
-          <a:xfrm>
-            <a:off x="557050" y="3053138"/>
-            <a:ext cx="2090490" cy="967818"/>
-          </a:xfrm>
-          <a:prstGeom prst="wedgeEllipseCallout">
-            <a:avLst>
-              <a:gd name="adj1" fmla="val 25995"/>
-              <a:gd name="adj2" fmla="val -61182"/>
-            </a:avLst>
-          </a:prstGeom>
-          <a:solidFill>
-            <a:schemeClr val="accent6">
-              <a:lumMod val="60000"/>
-              <a:lumOff val="40000"/>
-            </a:schemeClr>
-          </a:solidFill>
-          <a:ln w="12700">
-            <a:solidFill>
-              <a:schemeClr val="accent6">
-                <a:lumMod val="40000"/>
-                <a:lumOff val="60000"/>
-              </a:schemeClr>
-            </a:solidFill>
-          </a:ln>
-          <a:effectLst/>
-        </p:spPr>
-        <p:style>
-          <a:lnRef idx="3">
-            <a:schemeClr val="lt1"/>
-          </a:lnRef>
-          <a:fillRef idx="1">
-            <a:schemeClr val="accent6"/>
-          </a:fillRef>
-          <a:effectRef idx="1">
-            <a:schemeClr val="accent6"/>
-          </a:effectRef>
-          <a:fontRef idx="minor">
-            <a:schemeClr val="lt1"/>
-          </a:fontRef>
-        </p:style>
-        <p:txBody>
-          <a:bodyPr rtlCol="0" anchor="ctr"/>
-          <a:lstStyle/>
-          <a:p>
-            <a:pPr algn="ctr"/>
-            <a:r>
-              <a:rPr lang="ja-JP" altLang="en-US" dirty="0" smtClean="0">
+              <a:t>Control </a:t>
+            </a:r>
+            <a:r>
+              <a:rPr lang="en-US" altLang="ja-JP" sz="1600" dirty="0">
                 <a:solidFill>
                   <a:schemeClr val="tx1">
                     <a:lumMod val="75000"/>
@@ -9286,18 +9333,21 @@
                 <a:latin typeface="HGP創英角ｺﾞｼｯｸUB" panose="020B0900000000000000" pitchFamily="50" charset="-128"/>
                 <a:ea typeface="HGP創英角ｺﾞｼｯｸUB" panose="020B0900000000000000" pitchFamily="50" charset="-128"/>
               </a:rPr>
-              <a:t>フォーム認証用のサーブレットフィルタ</a:t>
-            </a:r>
-            <a:endParaRPr lang="en-US" altLang="ja-JP" dirty="0" smtClean="0">
-              <a:solidFill>
-                <a:schemeClr val="tx1">
-                  <a:lumMod val="75000"/>
-                  <a:lumOff val="25000"/>
-                </a:schemeClr>
-              </a:solidFill>
-              <a:latin typeface="HGP創英角ｺﾞｼｯｸUB" panose="020B0900000000000000" pitchFamily="50" charset="-128"/>
-              <a:ea typeface="HGP創英角ｺﾞｼｯｸUB" panose="020B0900000000000000" pitchFamily="50" charset="-128"/>
-            </a:endParaRPr>
+              <a:t>the response </a:t>
+            </a:r>
+            <a:r>
+              <a:rPr lang="en-US" altLang="ja-JP" sz="1600" dirty="0" smtClean="0">
+                <a:solidFill>
+                  <a:schemeClr val="tx1">
+                    <a:lumMod val="75000"/>
+                    <a:lumOff val="25000"/>
+                  </a:schemeClr>
+                </a:solidFill>
+                <a:latin typeface="HGP創英角ｺﾞｼｯｸUB" panose="020B0900000000000000" pitchFamily="50" charset="-128"/>
+                <a:ea typeface="HGP創英角ｺﾞｼｯｸUB" panose="020B0900000000000000" pitchFamily="50" charset="-128"/>
+              </a:rPr>
+              <a:t>on authentication failure</a:t>
+            </a:r>
           </a:p>
         </p:txBody>
       </p:sp>
@@ -10424,102 +10474,6 @@
       </p:cxnSp>
       <p:sp>
         <p:nvSpPr>
-          <p:cNvPr id="49" name="テキスト ボックス 48"/>
-          <p:cNvSpPr txBox="1"/>
-          <p:nvPr/>
-        </p:nvSpPr>
-        <p:spPr>
-          <a:xfrm>
-            <a:off x="3027666" y="4510349"/>
-            <a:ext cx="800219" cy="461665"/>
-          </a:xfrm>
-          <a:prstGeom prst="rect">
-            <a:avLst/>
-          </a:prstGeom>
-          <a:noFill/>
-        </p:spPr>
-        <p:txBody>
-          <a:bodyPr wrap="none" rtlCol="0">
-            <a:spAutoFit/>
-          </a:bodyPr>
-          <a:lstStyle/>
-          <a:p>
-            <a:r>
-              <a:rPr lang="ja-JP" altLang="en-US" sz="2400" dirty="0">
-                <a:solidFill>
-                  <a:schemeClr val="tx1">
-                    <a:lumMod val="50000"/>
-                    <a:lumOff val="50000"/>
-                  </a:schemeClr>
-                </a:solidFill>
-                <a:latin typeface="HGP創英角ｺﾞｼｯｸUB" panose="020B0900000000000000" pitchFamily="50" charset="-128"/>
-                <a:ea typeface="HGP創英角ｺﾞｼｯｸUB" panose="020B0900000000000000" pitchFamily="50" charset="-128"/>
-              </a:rPr>
-              <a:t>実装</a:t>
-            </a:r>
-            <a:endParaRPr kumimoji="1" lang="ja-JP" altLang="en-US" sz="2400" dirty="0">
-              <a:solidFill>
-                <a:schemeClr val="tx1">
-                  <a:lumMod val="50000"/>
-                  <a:lumOff val="50000"/>
-                </a:schemeClr>
-              </a:solidFill>
-              <a:latin typeface="HGP創英角ｺﾞｼｯｸUB" panose="020B0900000000000000" pitchFamily="50" charset="-128"/>
-              <a:ea typeface="HGP創英角ｺﾞｼｯｸUB" panose="020B0900000000000000" pitchFamily="50" charset="-128"/>
-            </a:endParaRPr>
-          </a:p>
-        </p:txBody>
-      </p:sp>
-      <p:sp>
-        <p:nvSpPr>
-          <p:cNvPr id="50" name="テキスト ボックス 49"/>
-          <p:cNvSpPr txBox="1"/>
-          <p:nvPr/>
-        </p:nvSpPr>
-        <p:spPr>
-          <a:xfrm>
-            <a:off x="5309556" y="4513176"/>
-            <a:ext cx="800219" cy="461665"/>
-          </a:xfrm>
-          <a:prstGeom prst="rect">
-            <a:avLst/>
-          </a:prstGeom>
-          <a:noFill/>
-        </p:spPr>
-        <p:txBody>
-          <a:bodyPr wrap="none" rtlCol="0">
-            <a:spAutoFit/>
-          </a:bodyPr>
-          <a:lstStyle/>
-          <a:p>
-            <a:r>
-              <a:rPr lang="ja-JP" altLang="en-US" sz="2400" dirty="0">
-                <a:solidFill>
-                  <a:schemeClr val="tx1">
-                    <a:lumMod val="50000"/>
-                    <a:lumOff val="50000"/>
-                  </a:schemeClr>
-                </a:solidFill>
-                <a:latin typeface="HGP創英角ｺﾞｼｯｸUB" panose="020B0900000000000000" pitchFamily="50" charset="-128"/>
-                <a:ea typeface="HGP創英角ｺﾞｼｯｸUB" panose="020B0900000000000000" pitchFamily="50" charset="-128"/>
-              </a:rPr>
-              <a:t>実装</a:t>
-            </a:r>
-            <a:endParaRPr kumimoji="1" lang="ja-JP" altLang="en-US" sz="2400" dirty="0">
-              <a:solidFill>
-                <a:schemeClr val="tx1">
-                  <a:lumMod val="50000"/>
-                  <a:lumOff val="50000"/>
-                </a:schemeClr>
-              </a:solidFill>
-              <a:latin typeface="HGP創英角ｺﾞｼｯｸUB" panose="020B0900000000000000" pitchFamily="50" charset="-128"/>
-              <a:ea typeface="HGP創英角ｺﾞｼｯｸUB" panose="020B0900000000000000" pitchFamily="50" charset="-128"/>
-            </a:endParaRPr>
-          </a:p>
-        </p:txBody>
-      </p:sp>
-      <p:sp>
-        <p:nvSpPr>
           <p:cNvPr id="52" name="正方形/長方形 51"/>
           <p:cNvSpPr/>
           <p:nvPr/>
@@ -10565,7 +10519,7 @@
           <a:p>
             <a:pPr algn="ctr"/>
             <a:r>
-              <a:rPr kumimoji="1" lang="ja-JP" altLang="en-US" sz="2000" dirty="0" smtClean="0">
+              <a:rPr kumimoji="1" lang="en-US" altLang="ja-JP" sz="2000" dirty="0" smtClean="0">
                 <a:solidFill>
                   <a:schemeClr val="tx1">
                     <a:lumMod val="50000"/>
@@ -10573,16 +10527,8 @@
                   </a:schemeClr>
                 </a:solidFill>
               </a:rPr>
-              <a:t>データストア</a:t>
-            </a:r>
-            <a:endParaRPr kumimoji="1" lang="en-US" altLang="ja-JP" sz="2000" dirty="0" smtClean="0">
-              <a:solidFill>
-                <a:schemeClr val="tx1">
-                  <a:lumMod val="50000"/>
-                  <a:lumOff val="50000"/>
-                </a:schemeClr>
-              </a:solidFill>
-            </a:endParaRPr>
+              <a:t>Data store</a:t>
+            </a:r>
           </a:p>
         </p:txBody>
       </p:sp>
@@ -10595,7 +10541,7 @@
         <p:spPr>
           <a:xfrm>
             <a:off x="7687395" y="4967675"/>
-            <a:ext cx="1152127" cy="1053613"/>
+            <a:ext cx="1184317" cy="1053613"/>
           </a:xfrm>
           <a:prstGeom prst="can">
             <a:avLst/>
@@ -10631,7 +10577,7 @@
           <a:p>
             <a:pPr algn="ctr"/>
             <a:r>
-              <a:rPr kumimoji="1" lang="ja-JP" altLang="en-US" dirty="0" smtClean="0">
+              <a:rPr kumimoji="1" lang="en-US" altLang="ja-JP" sz="1600" dirty="0" smtClean="0">
                 <a:solidFill>
                   <a:schemeClr val="tx1">
                     <a:lumMod val="65000"/>
@@ -10641,8 +10587,18 @@
                 <a:latin typeface="HGP創英角ｺﾞｼｯｸUB" panose="020B0900000000000000" pitchFamily="50" charset="-128"/>
                 <a:ea typeface="HGP創英角ｺﾞｼｯｸUB" panose="020B0900000000000000" pitchFamily="50" charset="-128"/>
               </a:rPr>
-              <a:t>ユーザー情報</a:t>
-            </a:r>
+              <a:t>User Information</a:t>
+            </a:r>
+            <a:endParaRPr kumimoji="1" lang="ja-JP" altLang="en-US" sz="1600" dirty="0" smtClean="0">
+              <a:solidFill>
+                <a:schemeClr val="tx1">
+                  <a:lumMod val="65000"/>
+                  <a:lumOff val="35000"/>
+                </a:schemeClr>
+              </a:solidFill>
+              <a:latin typeface="HGP創英角ｺﾞｼｯｸUB" panose="020B0900000000000000" pitchFamily="50" charset="-128"/>
+              <a:ea typeface="HGP創英角ｺﾞｼｯｸUB" panose="020B0900000000000000" pitchFamily="50" charset="-128"/>
+            </a:endParaRPr>
           </a:p>
         </p:txBody>
       </p:sp>
@@ -10938,8 +10894,8 @@
         </p:nvSpPr>
         <p:spPr>
           <a:xfrm>
-            <a:off x="596987" y="4399924"/>
-            <a:ext cx="2156286" cy="967818"/>
+            <a:off x="320511" y="4399924"/>
+            <a:ext cx="2432762" cy="1435268"/>
           </a:xfrm>
           <a:prstGeom prst="wedgeEllipseCallout">
             <a:avLst>
@@ -10983,7 +10939,7 @@
           <a:p>
             <a:pPr algn="ctr"/>
             <a:r>
-              <a:rPr lang="ja-JP" altLang="en-US" dirty="0" smtClean="0">
+              <a:rPr lang="en-US" altLang="ja-JP" dirty="0" smtClean="0">
                 <a:solidFill>
                   <a:schemeClr val="tx1">
                     <a:lumMod val="75000"/>
@@ -10993,13 +10949,77 @@
                 <a:latin typeface="HGP創英角ｺﾞｼｯｸUB" panose="020B0900000000000000" pitchFamily="50" charset="-128"/>
                 <a:ea typeface="HGP創英角ｺﾞｼｯｸUB" panose="020B0900000000000000" pitchFamily="50" charset="-128"/>
               </a:rPr>
-              <a:t>要件に合わせて実装クラスを作成</a:t>
-            </a:r>
-            <a:endParaRPr lang="en-US" altLang="ja-JP" dirty="0" smtClean="0">
+              <a:t>Create </a:t>
+            </a:r>
+            <a:r>
+              <a:rPr lang="en-US" altLang="ja-JP" dirty="0">
+                <a:solidFill>
+                  <a:schemeClr val="tx1">
+                    <a:lumMod val="75000"/>
+                    <a:lumOff val="25000"/>
+                  </a:schemeClr>
+                </a:solidFill>
+                <a:latin typeface="HGP創英角ｺﾞｼｯｸUB" panose="020B0900000000000000" pitchFamily="50" charset="-128"/>
+                <a:ea typeface="HGP創英角ｺﾞｼｯｸUB" panose="020B0900000000000000" pitchFamily="50" charset="-128"/>
+              </a:rPr>
+              <a:t>an implementation class to suit </a:t>
+            </a:r>
+            <a:r>
+              <a:rPr lang="en-US" altLang="ja-JP" dirty="0" smtClean="0">
+                <a:solidFill>
+                  <a:schemeClr val="tx1">
+                    <a:lumMod val="75000"/>
+                    <a:lumOff val="25000"/>
+                  </a:schemeClr>
+                </a:solidFill>
+                <a:latin typeface="HGP創英角ｺﾞｼｯｸUB" panose="020B0900000000000000" pitchFamily="50" charset="-128"/>
+                <a:ea typeface="HGP創英角ｺﾞｼｯｸUB" panose="020B0900000000000000" pitchFamily="50" charset="-128"/>
+              </a:rPr>
+              <a:t>requirements</a:t>
+            </a:r>
+          </a:p>
+        </p:txBody>
+      </p:sp>
+      <p:sp>
+        <p:nvSpPr>
+          <p:cNvPr id="29" name="テキスト ボックス 28"/>
+          <p:cNvSpPr txBox="1"/>
+          <p:nvPr/>
+        </p:nvSpPr>
+        <p:spPr>
+          <a:xfrm>
+            <a:off x="4379836" y="4577323"/>
+            <a:ext cx="1183337" cy="338554"/>
+          </a:xfrm>
+          <a:prstGeom prst="rect">
+            <a:avLst/>
+          </a:prstGeom>
+          <a:noFill/>
+        </p:spPr>
+        <p:txBody>
+          <a:bodyPr wrap="none" rtlCol="0">
+            <a:spAutoFit/>
+          </a:bodyPr>
+          <a:lstStyle/>
+          <a:p>
+            <a:r>
+              <a:rPr lang="en-US" altLang="ja-JP" sz="1600" dirty="0" smtClean="0">
+                <a:solidFill>
+                  <a:schemeClr val="tx1">
+                    <a:lumMod val="50000"/>
+                    <a:lumOff val="50000"/>
+                  </a:schemeClr>
+                </a:solidFill>
+                <a:latin typeface="HGP創英角ｺﾞｼｯｸUB" panose="020B0900000000000000" pitchFamily="50" charset="-128"/>
+                <a:ea typeface="HGP創英角ｺﾞｼｯｸUB" panose="020B0900000000000000" pitchFamily="50" charset="-128"/>
+              </a:rPr>
+              <a:t>implements</a:t>
+            </a:r>
+            <a:endParaRPr kumimoji="1" lang="ja-JP" altLang="en-US" sz="1600" dirty="0">
               <a:solidFill>
                 <a:schemeClr val="tx1">
-                  <a:lumMod val="75000"/>
-                  <a:lumOff val="25000"/>
+                  <a:lumMod val="50000"/>
+                  <a:lumOff val="50000"/>
                 </a:schemeClr>
               </a:solidFill>
               <a:latin typeface="HGP創英角ｺﾞｼｯｸUB" panose="020B0900000000000000" pitchFamily="50" charset="-128"/>
@@ -11113,8 +11133,8 @@
         </p:nvSpPr>
         <p:spPr>
           <a:xfrm>
-            <a:off x="1069925" y="862063"/>
-            <a:ext cx="1413843" cy="1866053"/>
+            <a:off x="1013587" y="862063"/>
+            <a:ext cx="1470182" cy="1866053"/>
           </a:xfrm>
           <a:prstGeom prst="rect">
             <a:avLst/>
@@ -11151,7 +11171,7 @@
           <a:p>
             <a:pPr algn="ctr"/>
             <a:r>
-              <a:rPr lang="ja-JP" altLang="en-US" dirty="0" smtClean="0">
+              <a:rPr lang="en-US" altLang="ja-JP" sz="1600" dirty="0" smtClean="0">
                 <a:solidFill>
                   <a:schemeClr val="tx1">
                     <a:lumMod val="75000"/>
@@ -11161,9 +11181,9 @@
                 <a:latin typeface="HGP創英角ｺﾞｼｯｸUB" panose="020B0900000000000000" pitchFamily="50" charset="-128"/>
                 <a:ea typeface="HGP創英角ｺﾞｼｯｸUB" panose="020B0900000000000000" pitchFamily="50" charset="-128"/>
               </a:rPr>
-              <a:t>認証機能</a:t>
-            </a:r>
-            <a:endParaRPr lang="en-US" altLang="ja-JP" dirty="0">
+              <a:t>Authentication</a:t>
+            </a:r>
+            <a:endParaRPr lang="en-US" altLang="ja-JP" sz="1600" dirty="0">
               <a:solidFill>
                 <a:schemeClr val="tx1">
                   <a:lumMod val="75000"/>
@@ -11407,54 +11427,6 @@
           </a:p>
         </p:txBody>
       </p:sp>
-      <p:sp>
-        <p:nvSpPr>
-          <p:cNvPr id="37" name="テキスト ボックス 36"/>
-          <p:cNvSpPr txBox="1"/>
-          <p:nvPr/>
-        </p:nvSpPr>
-        <p:spPr>
-          <a:xfrm>
-            <a:off x="5404793" y="1336837"/>
-            <a:ext cx="800219" cy="461665"/>
-          </a:xfrm>
-          <a:prstGeom prst="rect">
-            <a:avLst/>
-          </a:prstGeom>
-          <a:noFill/>
-        </p:spPr>
-        <p:txBody>
-          <a:bodyPr wrap="none" rtlCol="0">
-            <a:spAutoFit/>
-          </a:bodyPr>
-          <a:lstStyle/>
-          <a:p>
-            <a:r>
-              <a:rPr lang="ja-JP" altLang="en-US" sz="2400" dirty="0">
-                <a:solidFill>
-                  <a:schemeClr val="tx1">
-                    <a:lumMod val="50000"/>
-                    <a:lumOff val="50000"/>
-                  </a:schemeClr>
-                </a:solidFill>
-                <a:latin typeface="HGP創英角ｺﾞｼｯｸUB" panose="020B0900000000000000" pitchFamily="50" charset="-128"/>
-                <a:ea typeface="HGP創英角ｺﾞｼｯｸUB" panose="020B0900000000000000" pitchFamily="50" charset="-128"/>
-              </a:rPr>
-              <a:t>実装</a:t>
-            </a:r>
-            <a:endParaRPr kumimoji="1" lang="ja-JP" altLang="en-US" sz="2400" dirty="0">
-              <a:solidFill>
-                <a:schemeClr val="tx1">
-                  <a:lumMod val="50000"/>
-                  <a:lumOff val="50000"/>
-                </a:schemeClr>
-              </a:solidFill>
-              <a:latin typeface="HGP創英角ｺﾞｼｯｸUB" panose="020B0900000000000000" pitchFamily="50" charset="-128"/>
-              <a:ea typeface="HGP創英角ｺﾞｼｯｸUB" panose="020B0900000000000000" pitchFamily="50" charset="-128"/>
-            </a:endParaRPr>
-          </a:p>
-        </p:txBody>
-      </p:sp>
       <p:cxnSp>
         <p:nvCxnSpPr>
           <p:cNvPr id="38" name="直線矢印コネクタ 37"/>
@@ -11504,7 +11476,7 @@
         <p:spPr>
           <a:xfrm>
             <a:off x="2603027" y="826867"/>
-            <a:ext cx="1135386" cy="489415"/>
+            <a:ext cx="1582474" cy="489415"/>
           </a:xfrm>
           <a:prstGeom prst="rect">
             <a:avLst/>
@@ -11541,7 +11513,7 @@
           <a:p>
             <a:pPr algn="ctr"/>
             <a:r>
-              <a:rPr lang="ja-JP" altLang="en-US" dirty="0" smtClean="0">
+              <a:rPr lang="en-US" altLang="ja-JP" sz="1600" dirty="0" smtClean="0">
                 <a:solidFill>
                   <a:schemeClr val="tx1">
                     <a:lumMod val="75000"/>
@@ -11551,9 +11523,25 @@
                 <a:latin typeface="HGP創英角ｺﾞｼｯｸUB" panose="020B0900000000000000" pitchFamily="50" charset="-128"/>
                 <a:ea typeface="HGP創英角ｺﾞｼｯｸUB" panose="020B0900000000000000" pitchFamily="50" charset="-128"/>
               </a:rPr>
-              <a:t>認証情報</a:t>
-            </a:r>
-            <a:endParaRPr lang="en-US" altLang="ja-JP" dirty="0">
+              <a:t>Authentication</a:t>
+            </a:r>
+          </a:p>
+          <a:p>
+            <a:pPr algn="ctr"/>
+            <a:r>
+              <a:rPr lang="en-US" altLang="ja-JP" sz="1600" dirty="0" smtClean="0">
+                <a:solidFill>
+                  <a:schemeClr val="tx1">
+                    <a:lumMod val="75000"/>
+                    <a:lumOff val="25000"/>
+                  </a:schemeClr>
+                </a:solidFill>
+                <a:latin typeface="HGP創英角ｺﾞｼｯｸUB" panose="020B0900000000000000" pitchFamily="50" charset="-128"/>
+                <a:ea typeface="HGP創英角ｺﾞｼｯｸUB" panose="020B0900000000000000" pitchFamily="50" charset="-128"/>
+              </a:rPr>
+              <a:t>Information</a:t>
+            </a:r>
+            <a:endParaRPr lang="en-US" altLang="ja-JP" sz="1600" dirty="0">
               <a:solidFill>
                 <a:schemeClr val="tx1">
                   <a:lumMod val="75000"/>
@@ -11615,7 +11603,7 @@
         <p:spPr>
           <a:xfrm>
             <a:off x="2581477" y="2387564"/>
-            <a:ext cx="1135386" cy="489415"/>
+            <a:ext cx="1604024" cy="489415"/>
           </a:xfrm>
           <a:prstGeom prst="rect">
             <a:avLst/>
@@ -11652,7 +11640,7 @@
           <a:p>
             <a:pPr algn="ctr"/>
             <a:r>
-              <a:rPr lang="ja-JP" altLang="en-US" dirty="0" smtClean="0">
+              <a:rPr lang="en-US" altLang="ja-JP" sz="1600" dirty="0">
                 <a:solidFill>
                   <a:schemeClr val="tx1">
                     <a:lumMod val="75000"/>
@@ -11662,9 +11650,25 @@
                 <a:latin typeface="HGP創英角ｺﾞｼｯｸUB" panose="020B0900000000000000" pitchFamily="50" charset="-128"/>
                 <a:ea typeface="HGP創英角ｺﾞｼｯｸUB" panose="020B0900000000000000" pitchFamily="50" charset="-128"/>
               </a:rPr>
-              <a:t>認証例外</a:t>
-            </a:r>
-            <a:endParaRPr lang="en-US" altLang="ja-JP" dirty="0">
+              <a:t>Authentication</a:t>
+            </a:r>
+          </a:p>
+          <a:p>
+            <a:pPr algn="ctr"/>
+            <a:r>
+              <a:rPr lang="en-US" altLang="ja-JP" sz="1600" dirty="0" smtClean="0">
+                <a:solidFill>
+                  <a:schemeClr val="tx1">
+                    <a:lumMod val="75000"/>
+                    <a:lumOff val="25000"/>
+                  </a:schemeClr>
+                </a:solidFill>
+                <a:latin typeface="HGP創英角ｺﾞｼｯｸUB" panose="020B0900000000000000" pitchFamily="50" charset="-128"/>
+                <a:ea typeface="HGP創英角ｺﾞｼｯｸUB" panose="020B0900000000000000" pitchFamily="50" charset="-128"/>
+              </a:rPr>
+              <a:t>Exception</a:t>
+            </a:r>
+            <a:endParaRPr lang="en-US" altLang="ja-JP" sz="1600" dirty="0">
               <a:solidFill>
                 <a:schemeClr val="tx1">
                   <a:lumMod val="75000"/>
@@ -11833,34 +11837,14 @@
           <a:p>
             <a:pPr algn="ctr"/>
             <a:r>
-              <a:rPr lang="ja-JP" altLang="en-US" dirty="0">
+              <a:rPr lang="en-US" altLang="ja-JP" dirty="0" smtClean="0">
                 <a:solidFill>
                   <a:srgbClr val="C00000"/>
                 </a:solidFill>
                 <a:latin typeface="HGP創英角ｺﾞｼｯｸUB" panose="020B0900000000000000" pitchFamily="50" charset="-128"/>
                 <a:ea typeface="HGP創英角ｺﾞｼｯｸUB" panose="020B0900000000000000" pitchFamily="50" charset="-128"/>
               </a:rPr>
-              <a:t>認証</a:t>
-            </a:r>
-            <a:endParaRPr lang="en-US" altLang="ja-JP" dirty="0" smtClean="0">
-              <a:solidFill>
-                <a:srgbClr val="C00000"/>
-              </a:solidFill>
-              <a:latin typeface="HGP創英角ｺﾞｼｯｸUB" panose="020B0900000000000000" pitchFamily="50" charset="-128"/>
-              <a:ea typeface="HGP創英角ｺﾞｼｯｸUB" panose="020B0900000000000000" pitchFamily="50" charset="-128"/>
-            </a:endParaRPr>
-          </a:p>
-          <a:p>
-            <a:pPr algn="ctr"/>
-            <a:r>
-              <a:rPr lang="ja-JP" altLang="en-US" dirty="0" smtClean="0">
-                <a:solidFill>
-                  <a:srgbClr val="C00000"/>
-                </a:solidFill>
-                <a:latin typeface="HGP創英角ｺﾞｼｯｸUB" panose="020B0900000000000000" pitchFamily="50" charset="-128"/>
-                <a:ea typeface="HGP創英角ｺﾞｼｯｸUB" panose="020B0900000000000000" pitchFamily="50" charset="-128"/>
-              </a:rPr>
-              <a:t>エラー</a:t>
+              <a:t>Error!</a:t>
             </a:r>
             <a:endParaRPr kumimoji="1" lang="ja-JP" altLang="en-US" dirty="0">
               <a:solidFill>
@@ -11880,8 +11864,8 @@
         </p:nvSpPr>
         <p:spPr>
           <a:xfrm>
-            <a:off x="1446091" y="342066"/>
-            <a:ext cx="1135386" cy="489415"/>
+            <a:off x="1131710" y="342066"/>
+            <a:ext cx="1449767" cy="489415"/>
           </a:xfrm>
           <a:prstGeom prst="rect">
             <a:avLst/>
@@ -11913,7 +11897,7 @@
           <a:p>
             <a:pPr algn="ctr"/>
             <a:r>
-              <a:rPr lang="ja-JP" altLang="en-US" dirty="0" smtClean="0">
+              <a:rPr lang="en-US" altLang="ja-JP" sz="1600" dirty="0" smtClean="0">
                 <a:solidFill>
                   <a:schemeClr val="tx1">
                     <a:lumMod val="75000"/>
@@ -11923,9 +11907,22 @@
                 <a:latin typeface="HGP創英角ｺﾞｼｯｸUB" panose="020B0900000000000000" pitchFamily="50" charset="-128"/>
                 <a:ea typeface="HGP創英角ｺﾞｼｯｸUB" panose="020B0900000000000000" pitchFamily="50" charset="-128"/>
               </a:rPr>
-              <a:t>認証成功</a:t>
-            </a:r>
-            <a:endParaRPr lang="en-US" altLang="ja-JP" dirty="0">
+              <a:t>Authentication </a:t>
+            </a:r>
+            <a:r>
+              <a:rPr lang="en-US" altLang="ja-JP" sz="1600" dirty="0" err="1" smtClean="0">
+                <a:solidFill>
+                  <a:schemeClr val="tx1">
+                    <a:lumMod val="75000"/>
+                    <a:lumOff val="25000"/>
+                  </a:schemeClr>
+                </a:solidFill>
+                <a:latin typeface="HGP創英角ｺﾞｼｯｸUB" panose="020B0900000000000000" pitchFamily="50" charset="-128"/>
+                <a:ea typeface="HGP創英角ｺﾞｼｯｸUB" panose="020B0900000000000000" pitchFamily="50" charset="-128"/>
+              </a:rPr>
+              <a:t>succsess</a:t>
+            </a:r>
+            <a:endParaRPr lang="en-US" altLang="ja-JP" sz="1600" dirty="0">
               <a:solidFill>
                 <a:schemeClr val="tx1">
                   <a:lumMod val="75000"/>
@@ -12031,8 +12028,8 @@
         </p:nvSpPr>
         <p:spPr>
           <a:xfrm>
-            <a:off x="1131710" y="5005944"/>
-            <a:ext cx="1709047" cy="370357"/>
+            <a:off x="1131710" y="5005943"/>
+            <a:ext cx="1709047" cy="584151"/>
           </a:xfrm>
           <a:prstGeom prst="rect">
             <a:avLst/>
@@ -12066,14 +12063,14 @@
           <a:p>
             <a:pPr algn="ctr"/>
             <a:r>
-              <a:rPr lang="ja-JP" altLang="en-US" dirty="0" smtClean="0">
+              <a:rPr lang="en-US" altLang="ja-JP" dirty="0" smtClean="0">
                 <a:solidFill>
                   <a:schemeClr val="bg1"/>
                 </a:solidFill>
                 <a:latin typeface="HGP創英角ｺﾞｼｯｸUB" panose="020B0900000000000000" pitchFamily="50" charset="-128"/>
                 <a:ea typeface="HGP創英角ｺﾞｼｯｸUB" panose="020B0900000000000000" pitchFamily="50" charset="-128"/>
               </a:rPr>
-              <a:t>実装クラス</a:t>
+              <a:t>Implementation Class </a:t>
             </a:r>
             <a:endParaRPr lang="en-US" altLang="ja-JP" dirty="0">
               <a:solidFill>
@@ -12216,7 +12213,7 @@
         </p:nvSpPr>
         <p:spPr>
           <a:xfrm>
-            <a:off x="3828678" y="2564904"/>
+            <a:off x="4290588" y="2564904"/>
             <a:ext cx="1135386" cy="489415"/>
           </a:xfrm>
           <a:prstGeom prst="rect">
@@ -12274,7 +12271,7 @@
         </p:nvSpPr>
         <p:spPr>
           <a:xfrm>
-            <a:off x="3954000" y="2656108"/>
+            <a:off x="4434764" y="2646681"/>
             <a:ext cx="1135386" cy="489415"/>
           </a:xfrm>
           <a:prstGeom prst="rect">
@@ -12332,7 +12329,7 @@
         </p:nvSpPr>
         <p:spPr>
           <a:xfrm>
-            <a:off x="4098016" y="2728116"/>
+            <a:off x="4559926" y="2728116"/>
             <a:ext cx="1135386" cy="489415"/>
           </a:xfrm>
           <a:prstGeom prst="rect">
@@ -12390,7 +12387,7 @@
         </p:nvSpPr>
         <p:spPr>
           <a:xfrm>
-            <a:off x="4255749" y="2800124"/>
+            <a:off x="4717659" y="2800124"/>
             <a:ext cx="1135386" cy="489415"/>
           </a:xfrm>
           <a:prstGeom prst="rect">
@@ -12448,8 +12445,8 @@
         </p:nvSpPr>
         <p:spPr>
           <a:xfrm>
-            <a:off x="4003933" y="2709066"/>
-            <a:ext cx="1416988" cy="489415"/>
+            <a:off x="4331480" y="2746774"/>
+            <a:ext cx="1532497" cy="489415"/>
           </a:xfrm>
           <a:prstGeom prst="rect">
             <a:avLst/>
@@ -12481,7 +12478,7 @@
           <a:p>
             <a:pPr algn="ctr"/>
             <a:r>
-              <a:rPr lang="ja-JP" altLang="en-US" dirty="0" smtClean="0">
+              <a:rPr lang="en-US" altLang="ja-JP" sz="1600" dirty="0">
                 <a:solidFill>
                   <a:schemeClr val="tx1">
                     <a:lumMod val="75000"/>
@@ -12491,9 +12488,38 @@
                 <a:latin typeface="HGP創英角ｺﾞｼｯｸUB" panose="020B0900000000000000" pitchFamily="50" charset="-128"/>
                 <a:ea typeface="HGP創英角ｺﾞｼｯｸUB" panose="020B0900000000000000" pitchFamily="50" charset="-128"/>
               </a:rPr>
-              <a:t>認証イベント</a:t>
-            </a:r>
-            <a:endParaRPr lang="en-US" altLang="ja-JP" dirty="0">
+              <a:t>Authentication</a:t>
+            </a:r>
+          </a:p>
+          <a:p>
+            <a:pPr algn="ctr"/>
+            <a:r>
+              <a:rPr lang="en-US" altLang="ja-JP" sz="1600" dirty="0">
+                <a:solidFill>
+                  <a:schemeClr val="tx1">
+                    <a:lumMod val="75000"/>
+                    <a:lumOff val="25000"/>
+                  </a:schemeClr>
+                </a:solidFill>
+                <a:latin typeface="HGP創英角ｺﾞｼｯｸUB" panose="020B0900000000000000" pitchFamily="50" charset="-128"/>
+                <a:ea typeface="HGP創英角ｺﾞｼｯｸUB" panose="020B0900000000000000" pitchFamily="50" charset="-128"/>
+              </a:rPr>
+              <a:t>E</a:t>
+            </a:r>
+            <a:r>
+              <a:rPr lang="en-US" altLang="ja-JP" sz="1600" dirty="0" smtClean="0">
+                <a:solidFill>
+                  <a:schemeClr val="tx1">
+                    <a:lumMod val="75000"/>
+                    <a:lumOff val="25000"/>
+                  </a:schemeClr>
+                </a:solidFill>
+                <a:latin typeface="HGP創英角ｺﾞｼｯｸUB" panose="020B0900000000000000" pitchFamily="50" charset="-128"/>
+                <a:ea typeface="HGP創英角ｺﾞｼｯｸUB" panose="020B0900000000000000" pitchFamily="50" charset="-128"/>
+              </a:rPr>
+              <a:t>vent</a:t>
+            </a:r>
+            <a:endParaRPr lang="en-US" altLang="ja-JP" sz="1600" dirty="0">
               <a:solidFill>
                 <a:schemeClr val="tx1">
                   <a:lumMod val="75000"/>
@@ -12509,14 +12535,12 @@
       <p:cxnSp>
         <p:nvCxnSpPr>
           <p:cNvPr id="79" name="直線矢印コネクタ 73"/>
-          <p:cNvCxnSpPr>
-            <a:endCxn id="67" idx="0"/>
-          </p:cNvCxnSpPr>
+          <p:cNvCxnSpPr/>
           <p:nvPr/>
         </p:nvCxnSpPr>
         <p:spPr bwMode="invGray">
           <a:xfrm>
-            <a:off x="4418789" y="3289539"/>
+            <a:off x="4890128" y="3289539"/>
             <a:ext cx="0" cy="826005"/>
           </a:xfrm>
           <a:prstGeom prst="straightConnector1">
@@ -12549,54 +12573,6 @@
           </a:fontRef>
         </p:style>
       </p:cxnSp>
-      <p:sp>
-        <p:nvSpPr>
-          <p:cNvPr id="81" name="テキスト ボックス 80"/>
-          <p:cNvSpPr txBox="1"/>
-          <p:nvPr/>
-        </p:nvSpPr>
-        <p:spPr>
-          <a:xfrm>
-            <a:off x="4498335" y="3653879"/>
-            <a:ext cx="800219" cy="461665"/>
-          </a:xfrm>
-          <a:prstGeom prst="rect">
-            <a:avLst/>
-          </a:prstGeom>
-          <a:noFill/>
-        </p:spPr>
-        <p:txBody>
-          <a:bodyPr wrap="none" rtlCol="0">
-            <a:spAutoFit/>
-          </a:bodyPr>
-          <a:lstStyle/>
-          <a:p>
-            <a:r>
-              <a:rPr lang="ja-JP" altLang="en-US" sz="2400" dirty="0">
-                <a:solidFill>
-                  <a:schemeClr val="tx1">
-                    <a:lumMod val="50000"/>
-                    <a:lumOff val="50000"/>
-                  </a:schemeClr>
-                </a:solidFill>
-                <a:latin typeface="HGP創英角ｺﾞｼｯｸUB" panose="020B0900000000000000" pitchFamily="50" charset="-128"/>
-                <a:ea typeface="HGP創英角ｺﾞｼｯｸUB" panose="020B0900000000000000" pitchFamily="50" charset="-128"/>
-              </a:rPr>
-              <a:t>実装</a:t>
-            </a:r>
-            <a:endParaRPr kumimoji="1" lang="ja-JP" altLang="en-US" sz="2400" dirty="0">
-              <a:solidFill>
-                <a:schemeClr val="tx1">
-                  <a:lumMod val="50000"/>
-                  <a:lumOff val="50000"/>
-                </a:schemeClr>
-              </a:solidFill>
-              <a:latin typeface="HGP創英角ｺﾞｼｯｸUB" panose="020B0900000000000000" pitchFamily="50" charset="-128"/>
-              <a:ea typeface="HGP創英角ｺﾞｼｯｸUB" panose="020B0900000000000000" pitchFamily="50" charset="-128"/>
-            </a:endParaRPr>
-          </a:p>
-        </p:txBody>
-      </p:sp>
       <p:sp>
         <p:nvSpPr>
           <p:cNvPr id="82" name="正方形/長方形 81"/>
@@ -12686,8 +12662,8 @@
         </p:nvCxnSpPr>
         <p:spPr bwMode="invGray">
           <a:xfrm rot="10800000">
-            <a:off x="1986235" y="5376302"/>
-            <a:ext cx="1461095" cy="373723"/>
+            <a:off x="1986235" y="5590094"/>
+            <a:ext cx="1461095" cy="159930"/>
           </a:xfrm>
           <a:prstGeom prst="bentConnector2">
             <a:avLst/>
@@ -12726,7 +12702,7 @@
         </p:nvSpPr>
         <p:spPr>
           <a:xfrm>
-            <a:off x="6323458" y="5264352"/>
+            <a:off x="6672247" y="5264352"/>
             <a:ext cx="1629867" cy="974823"/>
           </a:xfrm>
           <a:prstGeom prst="rect">
@@ -12820,7 +12796,7 @@
         <p:spPr bwMode="invGray">
           <a:xfrm flipH="1" flipV="1">
             <a:off x="5156376" y="5750024"/>
-            <a:ext cx="1167082" cy="1740"/>
+            <a:ext cx="1515871" cy="1740"/>
           </a:xfrm>
           <a:prstGeom prst="straightConnector1">
             <a:avLst/>
@@ -12854,61 +12830,13 @@
       </p:cxnSp>
       <p:sp>
         <p:nvSpPr>
-          <p:cNvPr id="86" name="テキスト ボックス 85"/>
-          <p:cNvSpPr txBox="1"/>
-          <p:nvPr/>
-        </p:nvSpPr>
-        <p:spPr>
-          <a:xfrm>
-            <a:off x="5352906" y="5264352"/>
-            <a:ext cx="800219" cy="461665"/>
-          </a:xfrm>
-          <a:prstGeom prst="rect">
-            <a:avLst/>
-          </a:prstGeom>
-          <a:noFill/>
-        </p:spPr>
-        <p:txBody>
-          <a:bodyPr wrap="none" rtlCol="0">
-            <a:spAutoFit/>
-          </a:bodyPr>
-          <a:lstStyle/>
-          <a:p>
-            <a:r>
-              <a:rPr lang="ja-JP" altLang="en-US" sz="2400" dirty="0">
-                <a:solidFill>
-                  <a:schemeClr val="tx1">
-                    <a:lumMod val="50000"/>
-                    <a:lumOff val="50000"/>
-                  </a:schemeClr>
-                </a:solidFill>
-                <a:latin typeface="HGP創英角ｺﾞｼｯｸUB" panose="020B0900000000000000" pitchFamily="50" charset="-128"/>
-                <a:ea typeface="HGP創英角ｺﾞｼｯｸUB" panose="020B0900000000000000" pitchFamily="50" charset="-128"/>
-              </a:rPr>
-              <a:t>実装</a:t>
-            </a:r>
-            <a:endParaRPr kumimoji="1" lang="ja-JP" altLang="en-US" sz="2400" dirty="0">
-              <a:solidFill>
-                <a:schemeClr val="tx1">
-                  <a:lumMod val="50000"/>
-                  <a:lumOff val="50000"/>
-                </a:schemeClr>
-              </a:solidFill>
-              <a:latin typeface="HGP創英角ｺﾞｼｯｸUB" panose="020B0900000000000000" pitchFamily="50" charset="-128"/>
-              <a:ea typeface="HGP創英角ｺﾞｼｯｸUB" panose="020B0900000000000000" pitchFamily="50" charset="-128"/>
-            </a:endParaRPr>
-          </a:p>
-        </p:txBody>
-      </p:sp>
-      <p:sp>
-        <p:nvSpPr>
           <p:cNvPr id="89" name="正方形/長方形 88"/>
           <p:cNvSpPr/>
           <p:nvPr/>
         </p:nvSpPr>
         <p:spPr>
           <a:xfrm>
-            <a:off x="6098773" y="5032226"/>
+            <a:off x="6447562" y="5032226"/>
             <a:ext cx="2070576" cy="1409313"/>
           </a:xfrm>
           <a:prstGeom prst="rect">
@@ -12959,19 +12887,211 @@
       </p:sp>
       <p:sp>
         <p:nvSpPr>
-          <p:cNvPr id="97" name="円形吹き出し 96"/>
+          <p:cNvPr id="98" name="テキスト ボックス 97"/>
+          <p:cNvSpPr txBox="1"/>
+          <p:nvPr/>
+        </p:nvSpPr>
+        <p:spPr>
+          <a:xfrm>
+            <a:off x="2770202" y="1595252"/>
+            <a:ext cx="723275" cy="461665"/>
+          </a:xfrm>
+          <a:prstGeom prst="rect">
+            <a:avLst/>
+          </a:prstGeom>
+          <a:noFill/>
+        </p:spPr>
+        <p:txBody>
+          <a:bodyPr wrap="none" rtlCol="0">
+            <a:spAutoFit/>
+          </a:bodyPr>
+          <a:lstStyle/>
+          <a:p>
+            <a:r>
+              <a:rPr kumimoji="1" lang="ja-JP" altLang="en-US" sz="2400" dirty="0" smtClean="0">
+                <a:solidFill>
+                  <a:schemeClr val="tx1">
+                    <a:lumMod val="65000"/>
+                    <a:lumOff val="35000"/>
+                  </a:schemeClr>
+                </a:solidFill>
+                <a:latin typeface="HGP創英角ｺﾞｼｯｸUB" panose="020B0900000000000000" pitchFamily="50" charset="-128"/>
+                <a:ea typeface="HGP創英角ｺﾞｼｯｸUB" panose="020B0900000000000000" pitchFamily="50" charset="-128"/>
+              </a:rPr>
+              <a:t>（１）</a:t>
+            </a:r>
+            <a:endParaRPr kumimoji="1" lang="ja-JP" altLang="en-US" sz="2400" dirty="0">
+              <a:solidFill>
+                <a:schemeClr val="tx1">
+                  <a:lumMod val="65000"/>
+                  <a:lumOff val="35000"/>
+                </a:schemeClr>
+              </a:solidFill>
+              <a:latin typeface="HGP創英角ｺﾞｼｯｸUB" panose="020B0900000000000000" pitchFamily="50" charset="-128"/>
+              <a:ea typeface="HGP創英角ｺﾞｼｯｸUB" panose="020B0900000000000000" pitchFamily="50" charset="-128"/>
+            </a:endParaRPr>
+          </a:p>
+        </p:txBody>
+      </p:sp>
+      <p:sp>
+        <p:nvSpPr>
+          <p:cNvPr id="99" name="テキスト ボックス 98"/>
+          <p:cNvSpPr txBox="1"/>
+          <p:nvPr/>
+        </p:nvSpPr>
+        <p:spPr>
+          <a:xfrm>
+            <a:off x="5850718" y="2569291"/>
+            <a:ext cx="723275" cy="461665"/>
+          </a:xfrm>
+          <a:prstGeom prst="rect">
+            <a:avLst/>
+          </a:prstGeom>
+          <a:noFill/>
+        </p:spPr>
+        <p:txBody>
+          <a:bodyPr wrap="none" rtlCol="0">
+            <a:spAutoFit/>
+          </a:bodyPr>
+          <a:lstStyle/>
+          <a:p>
+            <a:r>
+              <a:rPr kumimoji="1" lang="ja-JP" altLang="en-US" sz="2400" dirty="0" smtClean="0">
+                <a:solidFill>
+                  <a:schemeClr val="tx1">
+                    <a:lumMod val="65000"/>
+                    <a:lumOff val="35000"/>
+                  </a:schemeClr>
+                </a:solidFill>
+                <a:latin typeface="HGP創英角ｺﾞｼｯｸUB" panose="020B0900000000000000" pitchFamily="50" charset="-128"/>
+                <a:ea typeface="HGP創英角ｺﾞｼｯｸUB" panose="020B0900000000000000" pitchFamily="50" charset="-128"/>
+              </a:rPr>
+              <a:t>（２）</a:t>
+            </a:r>
+            <a:endParaRPr kumimoji="1" lang="ja-JP" altLang="en-US" sz="2400" dirty="0">
+              <a:solidFill>
+                <a:schemeClr val="tx1">
+                  <a:lumMod val="65000"/>
+                  <a:lumOff val="35000"/>
+                </a:schemeClr>
+              </a:solidFill>
+              <a:latin typeface="HGP創英角ｺﾞｼｯｸUB" panose="020B0900000000000000" pitchFamily="50" charset="-128"/>
+              <a:ea typeface="HGP創英角ｺﾞｼｯｸUB" panose="020B0900000000000000" pitchFamily="50" charset="-128"/>
+            </a:endParaRPr>
+          </a:p>
+        </p:txBody>
+      </p:sp>
+      <p:sp>
+        <p:nvSpPr>
+          <p:cNvPr id="100" name="テキスト ボックス 99"/>
+          <p:cNvSpPr txBox="1"/>
+          <p:nvPr/>
+        </p:nvSpPr>
+        <p:spPr>
+          <a:xfrm>
+            <a:off x="1993507" y="5777510"/>
+            <a:ext cx="723275" cy="461665"/>
+          </a:xfrm>
+          <a:prstGeom prst="rect">
+            <a:avLst/>
+          </a:prstGeom>
+          <a:noFill/>
+        </p:spPr>
+        <p:txBody>
+          <a:bodyPr wrap="none" rtlCol="0">
+            <a:spAutoFit/>
+          </a:bodyPr>
+          <a:lstStyle/>
+          <a:p>
+            <a:r>
+              <a:rPr kumimoji="1" lang="ja-JP" altLang="en-US" sz="2400" dirty="0" smtClean="0">
+                <a:solidFill>
+                  <a:schemeClr val="tx1">
+                    <a:lumMod val="65000"/>
+                    <a:lumOff val="35000"/>
+                  </a:schemeClr>
+                </a:solidFill>
+                <a:latin typeface="HGP創英角ｺﾞｼｯｸUB" panose="020B0900000000000000" pitchFamily="50" charset="-128"/>
+                <a:ea typeface="HGP創英角ｺﾞｼｯｸUB" panose="020B0900000000000000" pitchFamily="50" charset="-128"/>
+              </a:rPr>
+              <a:t>（３）</a:t>
+            </a:r>
+            <a:endParaRPr kumimoji="1" lang="ja-JP" altLang="en-US" sz="2400" dirty="0">
+              <a:solidFill>
+                <a:schemeClr val="tx1">
+                  <a:lumMod val="65000"/>
+                  <a:lumOff val="35000"/>
+                </a:schemeClr>
+              </a:solidFill>
+              <a:latin typeface="HGP創英角ｺﾞｼｯｸUB" panose="020B0900000000000000" pitchFamily="50" charset="-128"/>
+              <a:ea typeface="HGP創英角ｺﾞｼｯｸUB" panose="020B0900000000000000" pitchFamily="50" charset="-128"/>
+            </a:endParaRPr>
+          </a:p>
+        </p:txBody>
+      </p:sp>
+      <p:sp>
+        <p:nvSpPr>
+          <p:cNvPr id="39" name="テキスト ボックス 38"/>
+          <p:cNvSpPr txBox="1"/>
+          <p:nvPr/>
+        </p:nvSpPr>
+        <p:spPr>
+          <a:xfrm>
+            <a:off x="5174333" y="1418672"/>
+            <a:ext cx="1183337" cy="338554"/>
+          </a:xfrm>
+          <a:prstGeom prst="rect">
+            <a:avLst/>
+          </a:prstGeom>
+          <a:noFill/>
+        </p:spPr>
+        <p:txBody>
+          <a:bodyPr wrap="none" rtlCol="0">
+            <a:spAutoFit/>
+          </a:bodyPr>
+          <a:lstStyle/>
+          <a:p>
+            <a:r>
+              <a:rPr lang="en-US" altLang="ja-JP" sz="1600" dirty="0" smtClean="0">
+                <a:solidFill>
+                  <a:schemeClr val="tx1">
+                    <a:lumMod val="50000"/>
+                    <a:lumOff val="50000"/>
+                  </a:schemeClr>
+                </a:solidFill>
+                <a:latin typeface="HGP創英角ｺﾞｼｯｸUB" panose="020B0900000000000000" pitchFamily="50" charset="-128"/>
+                <a:ea typeface="HGP創英角ｺﾞｼｯｸUB" panose="020B0900000000000000" pitchFamily="50" charset="-128"/>
+              </a:rPr>
+              <a:t>implements</a:t>
+            </a:r>
+            <a:endParaRPr kumimoji="1" lang="ja-JP" altLang="en-US" sz="1600" dirty="0">
+              <a:solidFill>
+                <a:schemeClr val="tx1">
+                  <a:lumMod val="50000"/>
+                  <a:lumOff val="50000"/>
+                </a:schemeClr>
+              </a:solidFill>
+              <a:latin typeface="HGP創英角ｺﾞｼｯｸUB" panose="020B0900000000000000" pitchFamily="50" charset="-128"/>
+              <a:ea typeface="HGP創英角ｺﾞｼｯｸUB" panose="020B0900000000000000" pitchFamily="50" charset="-128"/>
+            </a:endParaRPr>
+          </a:p>
+        </p:txBody>
+      </p:sp>
+      <p:sp>
+        <p:nvSpPr>
+          <p:cNvPr id="40" name="円形吹き出し 39"/>
           <p:cNvSpPr/>
           <p:nvPr/>
         </p:nvSpPr>
         <p:spPr>
           <a:xfrm>
-            <a:off x="5690506" y="3762350"/>
-            <a:ext cx="2227547" cy="967818"/>
+            <a:off x="5449818" y="3478280"/>
+            <a:ext cx="2432762" cy="1435268"/>
           </a:xfrm>
           <a:prstGeom prst="wedgeEllipseCallout">
             <a:avLst>
-              <a:gd name="adj1" fmla="val 12782"/>
-              <a:gd name="adj2" fmla="val 76603"/>
+              <a:gd name="adj1" fmla="val 16884"/>
+              <a:gd name="adj2" fmla="val 56931"/>
             </a:avLst>
           </a:prstGeom>
           <a:solidFill>
@@ -13010,7 +13130,7 @@
           <a:p>
             <a:pPr algn="ctr"/>
             <a:r>
-              <a:rPr lang="ja-JP" altLang="en-US" dirty="0" smtClean="0">
+              <a:rPr lang="en-US" altLang="ja-JP" dirty="0" smtClean="0">
                 <a:solidFill>
                   <a:schemeClr val="tx1">
                     <a:lumMod val="75000"/>
@@ -13020,31 +13140,47 @@
                 <a:latin typeface="HGP創英角ｺﾞｼｯｸUB" panose="020B0900000000000000" pitchFamily="50" charset="-128"/>
                 <a:ea typeface="HGP創英角ｺﾞｼｯｸUB" panose="020B0900000000000000" pitchFamily="50" charset="-128"/>
               </a:rPr>
-              <a:t>要件に合わせて実装クラスを作成</a:t>
-            </a:r>
-            <a:endParaRPr lang="en-US" altLang="ja-JP" dirty="0" smtClean="0">
-              <a:solidFill>
-                <a:schemeClr val="tx1">
-                  <a:lumMod val="75000"/>
-                  <a:lumOff val="25000"/>
-                </a:schemeClr>
-              </a:solidFill>
-              <a:latin typeface="HGP創英角ｺﾞｼｯｸUB" panose="020B0900000000000000" pitchFamily="50" charset="-128"/>
-              <a:ea typeface="HGP創英角ｺﾞｼｯｸUB" panose="020B0900000000000000" pitchFamily="50" charset="-128"/>
-            </a:endParaRPr>
-          </a:p>
-        </p:txBody>
-      </p:sp>
-      <p:sp>
-        <p:nvSpPr>
-          <p:cNvPr id="98" name="テキスト ボックス 97"/>
+              <a:t>Create </a:t>
+            </a:r>
+            <a:r>
+              <a:rPr lang="en-US" altLang="ja-JP" dirty="0">
+                <a:solidFill>
+                  <a:schemeClr val="tx1">
+                    <a:lumMod val="75000"/>
+                    <a:lumOff val="25000"/>
+                  </a:schemeClr>
+                </a:solidFill>
+                <a:latin typeface="HGP創英角ｺﾞｼｯｸUB" panose="020B0900000000000000" pitchFamily="50" charset="-128"/>
+                <a:ea typeface="HGP創英角ｺﾞｼｯｸUB" panose="020B0900000000000000" pitchFamily="50" charset="-128"/>
+              </a:rPr>
+              <a:t>an implementation class to suit </a:t>
+            </a:r>
+            <a:r>
+              <a:rPr lang="en-US" altLang="ja-JP" dirty="0" smtClean="0">
+                <a:solidFill>
+                  <a:schemeClr val="tx1">
+                    <a:lumMod val="75000"/>
+                    <a:lumOff val="25000"/>
+                  </a:schemeClr>
+                </a:solidFill>
+                <a:latin typeface="HGP創英角ｺﾞｼｯｸUB" panose="020B0900000000000000" pitchFamily="50" charset="-128"/>
+                <a:ea typeface="HGP創英角ｺﾞｼｯｸUB" panose="020B0900000000000000" pitchFamily="50" charset="-128"/>
+              </a:rPr>
+              <a:t>requirements</a:t>
+            </a:r>
+          </a:p>
+        </p:txBody>
+      </p:sp>
+      <p:sp>
+        <p:nvSpPr>
+          <p:cNvPr id="41" name="テキスト ボックス 40"/>
           <p:cNvSpPr txBox="1"/>
           <p:nvPr/>
         </p:nvSpPr>
         <p:spPr>
           <a:xfrm>
-            <a:off x="2770202" y="1595252"/>
-            <a:ext cx="723275" cy="461665"/>
+            <a:off x="3626365" y="3720800"/>
+            <a:ext cx="1183337" cy="338554"/>
           </a:xfrm>
           <a:prstGeom prst="rect">
             <a:avLst/>
@@ -13058,23 +13194,23 @@
           <a:lstStyle/>
           <a:p>
             <a:r>
-              <a:rPr kumimoji="1" lang="ja-JP" altLang="en-US" sz="2400" dirty="0" smtClean="0">
-                <a:solidFill>
-                  <a:schemeClr val="tx1">
-                    <a:lumMod val="65000"/>
-                    <a:lumOff val="35000"/>
+              <a:rPr lang="en-US" altLang="ja-JP" sz="1600" dirty="0" smtClean="0">
+                <a:solidFill>
+                  <a:schemeClr val="tx1">
+                    <a:lumMod val="50000"/>
+                    <a:lumOff val="50000"/>
                   </a:schemeClr>
                 </a:solidFill>
                 <a:latin typeface="HGP創英角ｺﾞｼｯｸUB" panose="020B0900000000000000" pitchFamily="50" charset="-128"/>
                 <a:ea typeface="HGP創英角ｺﾞｼｯｸUB" panose="020B0900000000000000" pitchFamily="50" charset="-128"/>
               </a:rPr>
-              <a:t>（１）</a:t>
-            </a:r>
-            <a:endParaRPr kumimoji="1" lang="ja-JP" altLang="en-US" sz="2400" dirty="0">
+              <a:t>implements</a:t>
+            </a:r>
+            <a:endParaRPr kumimoji="1" lang="ja-JP" altLang="en-US" sz="1600" dirty="0">
               <a:solidFill>
                 <a:schemeClr val="tx1">
-                  <a:lumMod val="65000"/>
-                  <a:lumOff val="35000"/>
+                  <a:lumMod val="50000"/>
+                  <a:lumOff val="50000"/>
                 </a:schemeClr>
               </a:solidFill>
               <a:latin typeface="HGP創英角ｺﾞｼｯｸUB" panose="020B0900000000000000" pitchFamily="50" charset="-128"/>
@@ -13085,14 +13221,14 @@
       </p:sp>
       <p:sp>
         <p:nvSpPr>
-          <p:cNvPr id="99" name="テキスト ボックス 98"/>
+          <p:cNvPr id="42" name="テキスト ボックス 41"/>
           <p:cNvSpPr txBox="1"/>
           <p:nvPr/>
         </p:nvSpPr>
         <p:spPr>
           <a:xfrm>
-            <a:off x="5850718" y="2569291"/>
-            <a:ext cx="723275" cy="461665"/>
+            <a:off x="5302713" y="5332219"/>
+            <a:ext cx="1183337" cy="338554"/>
           </a:xfrm>
           <a:prstGeom prst="rect">
             <a:avLst/>
@@ -13106,71 +13242,23 @@
           <a:lstStyle/>
           <a:p>
             <a:r>
-              <a:rPr kumimoji="1" lang="ja-JP" altLang="en-US" sz="2400" dirty="0" smtClean="0">
-                <a:solidFill>
-                  <a:schemeClr val="tx1">
-                    <a:lumMod val="65000"/>
-                    <a:lumOff val="35000"/>
+              <a:rPr lang="en-US" altLang="ja-JP" sz="1600" dirty="0" smtClean="0">
+                <a:solidFill>
+                  <a:schemeClr val="tx1">
+                    <a:lumMod val="50000"/>
+                    <a:lumOff val="50000"/>
                   </a:schemeClr>
                 </a:solidFill>
                 <a:latin typeface="HGP創英角ｺﾞｼｯｸUB" panose="020B0900000000000000" pitchFamily="50" charset="-128"/>
                 <a:ea typeface="HGP創英角ｺﾞｼｯｸUB" panose="020B0900000000000000" pitchFamily="50" charset="-128"/>
               </a:rPr>
-              <a:t>（２）</a:t>
-            </a:r>
-            <a:endParaRPr kumimoji="1" lang="ja-JP" altLang="en-US" sz="2400" dirty="0">
+              <a:t>implements</a:t>
+            </a:r>
+            <a:endParaRPr kumimoji="1" lang="ja-JP" altLang="en-US" sz="1600" dirty="0">
               <a:solidFill>
                 <a:schemeClr val="tx1">
-                  <a:lumMod val="65000"/>
-                  <a:lumOff val="35000"/>
-                </a:schemeClr>
-              </a:solidFill>
-              <a:latin typeface="HGP創英角ｺﾞｼｯｸUB" panose="020B0900000000000000" pitchFamily="50" charset="-128"/>
-              <a:ea typeface="HGP創英角ｺﾞｼｯｸUB" panose="020B0900000000000000" pitchFamily="50" charset="-128"/>
-            </a:endParaRPr>
-          </a:p>
-        </p:txBody>
-      </p:sp>
-      <p:sp>
-        <p:nvSpPr>
-          <p:cNvPr id="100" name="テキスト ボックス 99"/>
-          <p:cNvSpPr txBox="1"/>
-          <p:nvPr/>
-        </p:nvSpPr>
-        <p:spPr>
-          <a:xfrm>
-            <a:off x="1993507" y="5777510"/>
-            <a:ext cx="723275" cy="461665"/>
-          </a:xfrm>
-          <a:prstGeom prst="rect">
-            <a:avLst/>
-          </a:prstGeom>
-          <a:noFill/>
-        </p:spPr>
-        <p:txBody>
-          <a:bodyPr wrap="none" rtlCol="0">
-            <a:spAutoFit/>
-          </a:bodyPr>
-          <a:lstStyle/>
-          <a:p>
-            <a:r>
-              <a:rPr kumimoji="1" lang="ja-JP" altLang="en-US" sz="2400" dirty="0" smtClean="0">
-                <a:solidFill>
-                  <a:schemeClr val="tx1">
-                    <a:lumMod val="65000"/>
-                    <a:lumOff val="35000"/>
-                  </a:schemeClr>
-                </a:solidFill>
-                <a:latin typeface="HGP創英角ｺﾞｼｯｸUB" panose="020B0900000000000000" pitchFamily="50" charset="-128"/>
-                <a:ea typeface="HGP創英角ｺﾞｼｯｸUB" panose="020B0900000000000000" pitchFamily="50" charset="-128"/>
-              </a:rPr>
-              <a:t>（３）</a:t>
-            </a:r>
-            <a:endParaRPr kumimoji="1" lang="ja-JP" altLang="en-US" sz="2400" dirty="0">
-              <a:solidFill>
-                <a:schemeClr val="tx1">
-                  <a:lumMod val="65000"/>
-                  <a:lumOff val="35000"/>
+                  <a:lumMod val="50000"/>
+                  <a:lumOff val="50000"/>
                 </a:schemeClr>
               </a:solidFill>
               <a:latin typeface="HGP創英角ｺﾞｼｯｸUB" panose="020B0900000000000000" pitchFamily="50" charset="-128"/>
@@ -13617,8 +13705,9 @@
           </a:bodyPr>
           <a:lstStyle/>
           <a:p>
-            <a:r>
-              <a:rPr kumimoji="1" lang="ja-JP" altLang="en-US" sz="1600" b="1" dirty="0" smtClean="0">
+            <a:pPr algn="ctr"/>
+            <a:r>
+              <a:rPr kumimoji="1" lang="en-US" altLang="ja-JP" sz="1600" b="1" dirty="0" smtClean="0">
                 <a:solidFill>
                   <a:schemeClr val="tx1">
                     <a:lumMod val="75000"/>
@@ -13628,7 +13717,7 @@
                 <a:latin typeface="HGP創英角ｺﾞｼｯｸUB" panose="020B0900000000000000" pitchFamily="50" charset="-128"/>
                 <a:ea typeface="HGP創英角ｺﾞｼｯｸUB" panose="020B0900000000000000" pitchFamily="50" charset="-128"/>
               </a:rPr>
-              <a:t>クライアント</a:t>
+              <a:t>Client</a:t>
             </a:r>
             <a:endParaRPr kumimoji="1" lang="ja-JP" altLang="en-US" sz="1600" b="1" dirty="0">
               <a:solidFill>
@@ -13890,7 +13979,7 @@
           <a:p>
             <a:pPr algn="ctr"/>
             <a:r>
-              <a:rPr lang="ja-JP" altLang="en-US" dirty="0" smtClean="0">
+              <a:rPr lang="en-US" altLang="ja-JP" dirty="0">
                 <a:solidFill>
                   <a:schemeClr val="tx1">
                     <a:lumMod val="75000"/>
@@ -13900,23 +13989,10 @@
                 <a:latin typeface="HGP創英角ｺﾞｼｯｸUB" panose="020B0900000000000000" pitchFamily="50" charset="-128"/>
                 <a:ea typeface="HGP創英角ｺﾞｼｯｸUB" panose="020B0900000000000000" pitchFamily="50" charset="-128"/>
               </a:rPr>
-              <a:t>ログアウト</a:t>
-            </a:r>
-            <a:endParaRPr lang="en-US" altLang="ja-JP" dirty="0" smtClean="0">
-              <a:solidFill>
-                <a:schemeClr val="tx1">
-                  <a:lumMod val="75000"/>
-                  <a:lumOff val="25000"/>
-                </a:schemeClr>
-              </a:solidFill>
-              <a:latin typeface="HGP創英角ｺﾞｼｯｸUB" panose="020B0900000000000000" pitchFamily="50" charset="-128"/>
-              <a:ea typeface="HGP創英角ｺﾞｼｯｸUB" panose="020B0900000000000000" pitchFamily="50" charset="-128"/>
-            </a:endParaRPr>
-          </a:p>
-          <a:p>
-            <a:pPr algn="ctr"/>
-            <a:r>
-              <a:rPr lang="ja-JP" altLang="en-US" dirty="0" smtClean="0">
+              <a:t>Control the response on </a:t>
+            </a:r>
+            <a:r>
+              <a:rPr lang="en-US" altLang="ja-JP" dirty="0" smtClean="0">
                 <a:solidFill>
                   <a:schemeClr val="tx1">
                     <a:lumMod val="75000"/>
@@ -13926,9 +14002,9 @@
                 <a:latin typeface="HGP創英角ｺﾞｼｯｸUB" panose="020B0900000000000000" pitchFamily="50" charset="-128"/>
                 <a:ea typeface="HGP創英角ｺﾞｼｯｸUB" panose="020B0900000000000000" pitchFamily="50" charset="-128"/>
               </a:rPr>
-              <a:t>成功時のレスポンスを制御</a:t>
-            </a:r>
-            <a:endParaRPr lang="en-US" altLang="ja-JP" dirty="0" smtClean="0">
+              <a:t>log-out</a:t>
+            </a:r>
+            <a:endParaRPr lang="en-US" altLang="ja-JP" dirty="0">
               <a:solidFill>
                 <a:schemeClr val="tx1">
                   <a:lumMod val="75000"/>
@@ -14246,7 +14322,7 @@
           <a:p>
             <a:pPr algn="ctr"/>
             <a:r>
-              <a:rPr lang="ja-JP" altLang="en-US" dirty="0" smtClean="0">
+              <a:rPr lang="en-US" altLang="ja-JP" dirty="0" smtClean="0">
                 <a:solidFill>
                   <a:schemeClr val="tx1">
                     <a:lumMod val="75000"/>
@@ -14256,23 +14332,13 @@
                 <a:latin typeface="HGP創英角ｺﾞｼｯｸUB" panose="020B0900000000000000" pitchFamily="50" charset="-128"/>
                 <a:ea typeface="HGP創英角ｺﾞｼｯｸUB" panose="020B0900000000000000" pitchFamily="50" charset="-128"/>
               </a:rPr>
-              <a:t>ログアウト</a:t>
-            </a:r>
-            <a:endParaRPr lang="en-US" altLang="ja-JP" dirty="0" smtClean="0">
-              <a:solidFill>
-                <a:schemeClr val="tx1">
-                  <a:lumMod val="75000"/>
-                  <a:lumOff val="25000"/>
-                </a:schemeClr>
-              </a:solidFill>
-              <a:latin typeface="HGP創英角ｺﾞｼｯｸUB" panose="020B0900000000000000" pitchFamily="50" charset="-128"/>
-              <a:ea typeface="HGP創英角ｺﾞｼｯｸUB" panose="020B0900000000000000" pitchFamily="50" charset="-128"/>
-            </a:endParaRPr>
+              <a:t>Log-out</a:t>
+            </a:r>
           </a:p>
           <a:p>
             <a:pPr algn="ctr"/>
             <a:r>
-              <a:rPr lang="ja-JP" altLang="en-US" dirty="0">
+              <a:rPr lang="en-US" altLang="ja-JP" dirty="0" smtClean="0">
                 <a:solidFill>
                   <a:schemeClr val="tx1">
                     <a:lumMod val="75000"/>
@@ -14282,18 +14348,8 @@
                 <a:latin typeface="HGP創英角ｺﾞｼｯｸUB" panose="020B0900000000000000" pitchFamily="50" charset="-128"/>
                 <a:ea typeface="HGP創英角ｺﾞｼｯｸUB" panose="020B0900000000000000" pitchFamily="50" charset="-128"/>
               </a:rPr>
-              <a:t>処理</a:t>
-            </a:r>
-            <a:endParaRPr lang="en-US" altLang="ja-JP" dirty="0" smtClean="0">
-              <a:solidFill>
-                <a:schemeClr val="tx1">
-                  <a:lumMod val="75000"/>
-                  <a:lumOff val="25000"/>
-                </a:schemeClr>
-              </a:solidFill>
-              <a:latin typeface="HGP創英角ｺﾞｼｯｸUB" panose="020B0900000000000000" pitchFamily="50" charset="-128"/>
-              <a:ea typeface="HGP創英角ｺﾞｼｯｸUB" panose="020B0900000000000000" pitchFamily="50" charset="-128"/>
-            </a:endParaRPr>
+              <a:t>process</a:t>
+            </a:r>
           </a:p>
         </p:txBody>
       </p:sp>
@@ -14347,8 +14403,8 @@
         </p:nvSpPr>
         <p:spPr>
           <a:xfrm>
-            <a:off x="701066" y="2765105"/>
-            <a:ext cx="2009188" cy="1010257"/>
+            <a:off x="414779" y="2765105"/>
+            <a:ext cx="2295475" cy="1010257"/>
           </a:xfrm>
           <a:prstGeom prst="wedgeEllipseCallout">
             <a:avLst>
@@ -14392,7 +14448,7 @@
           <a:p>
             <a:pPr algn="ctr"/>
             <a:r>
-              <a:rPr lang="ja-JP" altLang="en-US" dirty="0" smtClean="0">
+              <a:rPr lang="en-US" altLang="ja-JP" dirty="0">
                 <a:solidFill>
                   <a:schemeClr val="tx1">
                     <a:lumMod val="75000"/>
@@ -14402,9 +14458,22 @@
                 <a:latin typeface="HGP創英角ｺﾞｼｯｸUB" panose="020B0900000000000000" pitchFamily="50" charset="-128"/>
                 <a:ea typeface="HGP創英角ｺﾞｼｯｸUB" panose="020B0900000000000000" pitchFamily="50" charset="-128"/>
               </a:rPr>
-              <a:t>ログアウト</a:t>
-            </a:r>
-            <a:endParaRPr lang="en-US" altLang="ja-JP" dirty="0" smtClean="0">
+              <a:t>Servlet </a:t>
+            </a:r>
+            <a:r>
+              <a:rPr lang="en-US" altLang="ja-JP" dirty="0" smtClean="0">
+                <a:solidFill>
+                  <a:schemeClr val="tx1">
+                    <a:lumMod val="75000"/>
+                    <a:lumOff val="25000"/>
+                  </a:schemeClr>
+                </a:solidFill>
+                <a:latin typeface="HGP創英角ｺﾞｼｯｸUB" panose="020B0900000000000000" pitchFamily="50" charset="-128"/>
+                <a:ea typeface="HGP創英角ｺﾞｼｯｸUB" panose="020B0900000000000000" pitchFamily="50" charset="-128"/>
+              </a:rPr>
+              <a:t>Filter</a:t>
+            </a:r>
+            <a:endParaRPr lang="en-US" altLang="ja-JP" dirty="0">
               <a:solidFill>
                 <a:schemeClr val="tx1">
                   <a:lumMod val="75000"/>
@@ -14418,7 +14487,7 @@
           <a:p>
             <a:pPr algn="ctr"/>
             <a:r>
-              <a:rPr lang="ja-JP" altLang="en-US" dirty="0" smtClean="0">
+              <a:rPr lang="en-US" altLang="ja-JP" dirty="0">
                 <a:solidFill>
                   <a:schemeClr val="tx1">
                     <a:lumMod val="75000"/>
@@ -14428,9 +14497,22 @@
                 <a:latin typeface="HGP創英角ｺﾞｼｯｸUB" panose="020B0900000000000000" pitchFamily="50" charset="-128"/>
                 <a:ea typeface="HGP創英角ｺﾞｼｯｸUB" panose="020B0900000000000000" pitchFamily="50" charset="-128"/>
               </a:rPr>
-              <a:t>用のサーブレットフィルタ</a:t>
-            </a:r>
-            <a:endParaRPr lang="en-US" altLang="ja-JP" dirty="0" smtClean="0">
+              <a:t>for </a:t>
+            </a:r>
+            <a:r>
+              <a:rPr lang="en-US" altLang="ja-JP" dirty="0" smtClean="0">
+                <a:solidFill>
+                  <a:schemeClr val="tx1">
+                    <a:lumMod val="75000"/>
+                    <a:lumOff val="25000"/>
+                  </a:schemeClr>
+                </a:solidFill>
+                <a:latin typeface="HGP創英角ｺﾞｼｯｸUB" panose="020B0900000000000000" pitchFamily="50" charset="-128"/>
+                <a:ea typeface="HGP創英角ｺﾞｼｯｸUB" panose="020B0900000000000000" pitchFamily="50" charset="-128"/>
+              </a:rPr>
+              <a:t>Log-out</a:t>
+            </a:r>
+            <a:endParaRPr lang="en-US" altLang="ja-JP" dirty="0">
               <a:solidFill>
                 <a:schemeClr val="tx1">
                   <a:lumMod val="75000"/>
@@ -14451,7 +14533,7 @@
         </p:nvSpPr>
         <p:spPr>
           <a:xfrm>
-            <a:off x="6654205" y="2151054"/>
+            <a:off x="6786183" y="2151054"/>
             <a:ext cx="1800200" cy="621907"/>
           </a:xfrm>
           <a:prstGeom prst="rect">
@@ -14522,7 +14604,7 @@
         </p:nvSpPr>
         <p:spPr>
           <a:xfrm>
-            <a:off x="6660232" y="2821754"/>
+            <a:off x="6792210" y="2821754"/>
             <a:ext cx="1800200" cy="608248"/>
           </a:xfrm>
           <a:prstGeom prst="rect">
@@ -14619,7 +14701,7 @@
         </p:nvSpPr>
         <p:spPr>
           <a:xfrm>
-            <a:off x="6660232" y="3487800"/>
+            <a:off x="6792210" y="3487800"/>
             <a:ext cx="1800200" cy="621906"/>
           </a:xfrm>
           <a:prstGeom prst="rect">
@@ -14706,7 +14788,7 @@
         </p:nvSpPr>
         <p:spPr>
           <a:xfrm>
-            <a:off x="6876256" y="4157007"/>
+            <a:off x="7008234" y="4157007"/>
             <a:ext cx="1085875" cy="567858"/>
           </a:xfrm>
           <a:prstGeom prst="rect">
@@ -14777,7 +14859,7 @@
         </p:nvSpPr>
         <p:spPr>
           <a:xfrm>
-            <a:off x="7028656" y="4219769"/>
+            <a:off x="7160634" y="4219769"/>
             <a:ext cx="1085875" cy="567858"/>
           </a:xfrm>
           <a:prstGeom prst="rect">
@@ -14848,7 +14930,7 @@
         </p:nvSpPr>
         <p:spPr>
           <a:xfrm>
-            <a:off x="7181056" y="4310827"/>
+            <a:off x="7313034" y="4310827"/>
             <a:ext cx="1085875" cy="567858"/>
           </a:xfrm>
           <a:prstGeom prst="rect">
@@ -14919,7 +15001,7 @@
         </p:nvSpPr>
         <p:spPr>
           <a:xfrm>
-            <a:off x="6516216" y="1988840"/>
+            <a:off x="6648194" y="1988840"/>
             <a:ext cx="2088232" cy="3005626"/>
           </a:xfrm>
           <a:prstGeom prst="rect">
@@ -14976,8 +15058,8 @@
         </p:nvCxnSpPr>
         <p:spPr bwMode="invGray">
           <a:xfrm flipH="1">
-            <a:off x="5615517" y="3346814"/>
-            <a:ext cx="919717" cy="2716"/>
+            <a:off x="5615518" y="3333050"/>
+            <a:ext cx="1017421" cy="16480"/>
           </a:xfrm>
           <a:prstGeom prst="straightConnector1">
             <a:avLst/>
@@ -15011,14 +15093,14 @@
       </p:cxnSp>
       <p:sp>
         <p:nvSpPr>
-          <p:cNvPr id="46" name="テキスト ボックス 45"/>
+          <p:cNvPr id="26" name="テキスト ボックス 25"/>
           <p:cNvSpPr txBox="1"/>
           <p:nvPr/>
         </p:nvSpPr>
         <p:spPr>
           <a:xfrm>
-            <a:off x="5684790" y="2778674"/>
-            <a:ext cx="800219" cy="461665"/>
+            <a:off x="5534078" y="2880553"/>
+            <a:ext cx="1183337" cy="338554"/>
           </a:xfrm>
           <a:prstGeom prst="rect">
             <a:avLst/>
@@ -15032,7 +15114,7 @@
           <a:lstStyle/>
           <a:p>
             <a:r>
-              <a:rPr lang="ja-JP" altLang="en-US" sz="2400" dirty="0">
+              <a:rPr lang="en-US" altLang="ja-JP" sz="1600" dirty="0" smtClean="0">
                 <a:solidFill>
                   <a:schemeClr val="tx1">
                     <a:lumMod val="50000"/>
@@ -15042,9 +15124,9 @@
                 <a:latin typeface="HGP創英角ｺﾞｼｯｸUB" panose="020B0900000000000000" pitchFamily="50" charset="-128"/>
                 <a:ea typeface="HGP創英角ｺﾞｼｯｸUB" panose="020B0900000000000000" pitchFamily="50" charset="-128"/>
               </a:rPr>
-              <a:t>実装</a:t>
-            </a:r>
-            <a:endParaRPr kumimoji="1" lang="ja-JP" altLang="en-US" sz="2400" dirty="0">
+              <a:t>implements</a:t>
+            </a:r>
+            <a:endParaRPr kumimoji="1" lang="ja-JP" altLang="en-US" sz="1600" dirty="0">
               <a:solidFill>
                 <a:schemeClr val="tx1">
                   <a:lumMod val="50000"/>

</xml_diff>